<commit_message>
retoco el bussines plan y agrego cosas a la ppt
</commit_message>
<xml_diff>
--- a/Presentacion.pptx
+++ b/Presentacion.pptx
@@ -5,7 +5,7 @@
     <p:sldMasterId id="2147483660" r:id="rId1"/>
   </p:sldMasterIdLst>
   <p:notesMasterIdLst>
-    <p:notesMasterId r:id="rId12"/>
+    <p:notesMasterId r:id="rId19"/>
   </p:notesMasterIdLst>
   <p:sldIdLst>
     <p:sldId id="256" r:id="rId2"/>
@@ -18,6 +18,13 @@
     <p:sldId id="266" r:id="rId9"/>
     <p:sldId id="267" r:id="rId10"/>
     <p:sldId id="268" r:id="rId11"/>
+    <p:sldId id="269" r:id="rId12"/>
+    <p:sldId id="270" r:id="rId13"/>
+    <p:sldId id="271" r:id="rId14"/>
+    <p:sldId id="272" r:id="rId15"/>
+    <p:sldId id="273" r:id="rId16"/>
+    <p:sldId id="274" r:id="rId17"/>
+    <p:sldId id="275" r:id="rId18"/>
   </p:sldIdLst>
   <p:sldSz cx="9144000" cy="6858000" type="screen4x3"/>
   <p:notesSz cx="6858000" cy="9144000"/>
@@ -1086,6 +1093,13 @@
         </dgm:presLayoutVars>
       </dgm:prSet>
       <dgm:spPr/>
+      <dgm:t>
+        <a:bodyPr/>
+        <a:lstStyle/>
+        <a:p>
+          <a:endParaRPr lang="es-AR"/>
+        </a:p>
+      </dgm:t>
     </dgm:pt>
     <dgm:pt modelId="{4F428F06-F9DF-4CA1-9AB7-A8AB6C680FC8}" type="pres">
       <dgm:prSet presAssocID="{6C563E53-F598-431D-A12D-F840AB39FD7C}" presName="diamond" presStyleLbl="bgShp" presStyleIdx="0" presStyleCnt="1"/>
@@ -1100,6 +1114,13 @@
         </dgm:presLayoutVars>
       </dgm:prSet>
       <dgm:spPr/>
+      <dgm:t>
+        <a:bodyPr/>
+        <a:lstStyle/>
+        <a:p>
+          <a:endParaRPr lang="es-AR"/>
+        </a:p>
+      </dgm:t>
     </dgm:pt>
     <dgm:pt modelId="{DA299C92-D329-4A72-AD1E-F7EEC12CAD0B}" type="pres">
       <dgm:prSet presAssocID="{6C563E53-F598-431D-A12D-F840AB39FD7C}" presName="quad2" presStyleLbl="node1" presStyleIdx="1" presStyleCnt="4">
@@ -1110,6 +1131,13 @@
         </dgm:presLayoutVars>
       </dgm:prSet>
       <dgm:spPr/>
+      <dgm:t>
+        <a:bodyPr/>
+        <a:lstStyle/>
+        <a:p>
+          <a:endParaRPr lang="es-AR"/>
+        </a:p>
+      </dgm:t>
     </dgm:pt>
     <dgm:pt modelId="{848D594F-8696-46AC-B732-EDD83B603BEA}" type="pres">
       <dgm:prSet presAssocID="{6C563E53-F598-431D-A12D-F840AB39FD7C}" presName="quad3" presStyleLbl="node1" presStyleIdx="2" presStyleCnt="4">
@@ -2894,7 +2922,7 @@
               <a:pPr>
                 <a:defRPr/>
               </a:pPr>
-              <a:t>9/18/2010</a:t>
+              <a:t>9/19/2010</a:t>
             </a:fld>
             <a:endParaRPr lang="en-US"/>
           </a:p>
@@ -3854,7 +3882,7 @@
               <a:pPr>
                 <a:defRPr/>
               </a:pPr>
-              <a:t>9/18/2010</a:t>
+              <a:t>9/19/2010</a:t>
             </a:fld>
             <a:endParaRPr lang="es-AR" dirty="0"/>
           </a:p>
@@ -8515,7 +8543,1395 @@
           <a:bodyPr/>
           <a:lstStyle/>
           <a:p>
+            <a:r>
+              <a:rPr lang="es-AR" dirty="0" smtClean="0"/>
+              <a:t>Infraestructura Interna</a:t>
+            </a:r>
             <a:endParaRPr lang="es-AR" dirty="0"/>
+          </a:p>
+        </p:txBody>
+      </p:sp>
+      <p:pic>
+        <p:nvPicPr>
+          <p:cNvPr id="1026" name="Picture 2"/>
+          <p:cNvPicPr>
+            <a:picLocks noChangeAspect="1" noChangeArrowheads="1"/>
+          </p:cNvPicPr>
+          <p:nvPr/>
+        </p:nvPicPr>
+        <p:blipFill>
+          <a:blip r:embed="rId2">
+            <a:extLst>
+              <a:ext uri="{28A0092B-C50C-407E-A947-70E740481C1C}">
+                <a14:useLocalDpi xmlns:a14="http://schemas.microsoft.com/office/drawing/2010/main" val="0"/>
+              </a:ext>
+            </a:extLst>
+          </a:blip>
+          <a:srcRect l="31799" t="27444" r="19695" b="12321"/>
+          <a:stretch>
+            <a:fillRect/>
+          </a:stretch>
+        </p:blipFill>
+        <p:spPr bwMode="auto">
+          <a:xfrm>
+            <a:off x="971600" y="620688"/>
+            <a:ext cx="7778999" cy="5495702"/>
+          </a:xfrm>
+          <a:prstGeom prst="rect">
+            <a:avLst/>
+          </a:prstGeom>
+          <a:solidFill>
+            <a:srgbClr val="FFFFFF">
+              <a:alpha val="0"/>
+            </a:srgbClr>
+          </a:solidFill>
+          <a:ln>
+            <a:noFill/>
+          </a:ln>
+          <a:extLst>
+            <a:ext uri="{91240B29-F687-4F45-9708-019B960494DF}">
+              <a14:hiddenLine xmlns:a14="http://schemas.microsoft.com/office/drawing/2010/main" w="9525">
+                <a:solidFill>
+                  <a:srgbClr val="000000"/>
+                </a:solidFill>
+                <a:miter lim="800000"/>
+                <a:headEnd/>
+                <a:tailEnd/>
+              </a14:hiddenLine>
+            </a:ext>
+          </a:extLst>
+        </p:spPr>
+      </p:pic>
+    </p:spTree>
+    <p:extLst>
+      <p:ext uri="{BB962C8B-B14F-4D97-AF65-F5344CB8AC3E}">
+        <p14:creationId xmlns:p14="http://schemas.microsoft.com/office/powerpoint/2010/main" val="2913108884"/>
+      </p:ext>
+    </p:extLst>
+  </p:cSld>
+  <p:clrMapOvr>
+    <a:masterClrMapping/>
+  </p:clrMapOvr>
+</p:sld>
+</file>
+
+<file path=ppt/slides/slide11.xml><?xml version="1.0" encoding="utf-8"?>
+<p:sld xmlns:a="http://schemas.openxmlformats.org/drawingml/2006/main" xmlns:r="http://schemas.openxmlformats.org/officeDocument/2006/relationships" xmlns:p="http://schemas.openxmlformats.org/presentationml/2006/main">
+  <p:cSld>
+    <p:spTree>
+      <p:nvGrpSpPr>
+        <p:cNvPr id="1" name=""/>
+        <p:cNvGrpSpPr/>
+        <p:nvPr/>
+      </p:nvGrpSpPr>
+      <p:grpSpPr>
+        <a:xfrm>
+          <a:off x="0" y="0"/>
+          <a:ext cx="0" cy="0"/>
+          <a:chOff x="0" y="0"/>
+          <a:chExt cx="0" cy="0"/>
+        </a:xfrm>
+      </p:grpSpPr>
+      <p:sp>
+        <p:nvSpPr>
+          <p:cNvPr id="2" name="Title 1"/>
+          <p:cNvSpPr>
+            <a:spLocks noGrp="1"/>
+          </p:cNvSpPr>
+          <p:nvPr>
+            <p:ph type="title"/>
+          </p:nvPr>
+        </p:nvSpPr>
+        <p:spPr/>
+        <p:txBody>
+          <a:bodyPr/>
+          <a:lstStyle/>
+          <a:p>
+            <a:r>
+              <a:rPr lang="es-AR" dirty="0" smtClean="0"/>
+              <a:t>Infraestructura Interna - Servidores</a:t>
+            </a:r>
+            <a:endParaRPr lang="es-AR" dirty="0"/>
+          </a:p>
+        </p:txBody>
+      </p:sp>
+      <p:sp>
+        <p:nvSpPr>
+          <p:cNvPr id="3" name="Content Placeholder 2"/>
+          <p:cNvSpPr>
+            <a:spLocks noGrp="1"/>
+          </p:cNvSpPr>
+          <p:nvPr>
+            <p:ph idx="1"/>
+          </p:nvPr>
+        </p:nvSpPr>
+        <p:spPr>
+          <a:xfrm>
+            <a:off x="722313" y="1052737"/>
+            <a:ext cx="7888287" cy="4967064"/>
+          </a:xfrm>
+        </p:spPr>
+        <p:txBody>
+          <a:bodyPr/>
+          <a:lstStyle/>
+          <a:p>
+            <a:pPr marL="0" indent="0" algn="ctr">
+              <a:buNone/>
+            </a:pPr>
+            <a:r>
+              <a:rPr lang="es-AR" sz="1600" b="1" dirty="0" smtClean="0"/>
+              <a:t>Servidor 1: Herramientas Anexas</a:t>
+            </a:r>
+          </a:p>
+          <a:p>
+            <a:pPr marL="0" indent="0" algn="ctr">
+              <a:buNone/>
+            </a:pPr>
+            <a:endParaRPr lang="es-AR" sz="1600" dirty="0"/>
+          </a:p>
+          <a:p>
+            <a:pPr lvl="0"/>
+            <a:r>
+              <a:rPr lang="en-US" sz="1600" b="1" u="sng" dirty="0" smtClean="0"/>
+              <a:t>Roles:</a:t>
+            </a:r>
+            <a:endParaRPr lang="en-US" sz="1600" dirty="0"/>
+          </a:p>
+          <a:p>
+            <a:pPr lvl="1"/>
+            <a:r>
+              <a:rPr lang="es-AR" sz="1600" b="1" dirty="0" smtClean="0"/>
+              <a:t>Email</a:t>
+            </a:r>
+            <a:r>
+              <a:rPr lang="es-AR" sz="1600" dirty="0"/>
+              <a:t>: Se instalará un servidor </a:t>
+            </a:r>
+            <a:r>
+              <a:rPr lang="es-AR" sz="1600" dirty="0" err="1"/>
+              <a:t>Postfix</a:t>
+            </a:r>
+            <a:r>
+              <a:rPr lang="es-AR" sz="1600" dirty="0"/>
+              <a:t> con soporte de protocolos SMTP e IMAP,</a:t>
+            </a:r>
+          </a:p>
+          <a:p>
+            <a:pPr lvl="1"/>
+            <a:r>
+              <a:rPr lang="es-AR" sz="1600" b="1" dirty="0" err="1"/>
+              <a:t>Networking</a:t>
+            </a:r>
+            <a:r>
+              <a:rPr lang="es-AR" sz="1600" dirty="0"/>
+              <a:t>:</a:t>
+            </a:r>
+          </a:p>
+          <a:p>
+            <a:pPr lvl="2"/>
+            <a:r>
+              <a:rPr lang="es-AR" sz="1600" u="sng" dirty="0"/>
+              <a:t>DNS</a:t>
+            </a:r>
+            <a:r>
+              <a:rPr lang="es-AR" sz="1600" dirty="0"/>
+              <a:t>: Bind9 o similar.</a:t>
+            </a:r>
+          </a:p>
+          <a:p>
+            <a:pPr lvl="2"/>
+            <a:r>
+              <a:rPr lang="es-AR" sz="1600" u="sng" dirty="0"/>
+              <a:t>DHCP</a:t>
+            </a:r>
+            <a:r>
+              <a:rPr lang="es-AR" sz="1600" dirty="0"/>
+              <a:t>: Proporcionado por el SO.</a:t>
+            </a:r>
+          </a:p>
+          <a:p>
+            <a:pPr lvl="2"/>
+            <a:r>
+              <a:rPr lang="es-AR" sz="1600" u="sng" dirty="0"/>
+              <a:t>LDAP</a:t>
+            </a:r>
+            <a:r>
+              <a:rPr lang="es-AR" sz="1600" dirty="0"/>
+              <a:t>: </a:t>
+            </a:r>
+            <a:r>
+              <a:rPr lang="es-AR" sz="1600" dirty="0" err="1"/>
+              <a:t>OpenLDAP</a:t>
+            </a:r>
+            <a:endParaRPr lang="es-AR" sz="1600" dirty="0"/>
+          </a:p>
+          <a:p>
+            <a:pPr lvl="1"/>
+            <a:r>
+              <a:rPr lang="es-AR" sz="1600" b="1" dirty="0"/>
+              <a:t>SCM</a:t>
+            </a:r>
+            <a:r>
+              <a:rPr lang="es-AR" sz="1600" dirty="0"/>
+              <a:t>: </a:t>
+            </a:r>
+            <a:r>
+              <a:rPr lang="es-AR" sz="1600" dirty="0" smtClean="0"/>
+              <a:t>(</a:t>
+            </a:r>
+            <a:r>
+              <a:rPr lang="es-AR" sz="1600" dirty="0" err="1" smtClean="0"/>
+              <a:t>Source</a:t>
+            </a:r>
+            <a:r>
+              <a:rPr lang="es-AR" sz="1600" dirty="0" smtClean="0"/>
+              <a:t> </a:t>
+            </a:r>
+            <a:r>
+              <a:rPr lang="es-AR" sz="1600" dirty="0"/>
+              <a:t>control </a:t>
+            </a:r>
+            <a:r>
+              <a:rPr lang="es-AR" sz="1600" dirty="0" smtClean="0"/>
+              <a:t>manager): </a:t>
+            </a:r>
+            <a:r>
+              <a:rPr lang="es-AR" sz="1600" dirty="0"/>
+              <a:t>se eligió </a:t>
+            </a:r>
+            <a:r>
+              <a:rPr lang="es-AR" sz="1600" dirty="0" err="1"/>
+              <a:t>git</a:t>
+            </a:r>
+            <a:r>
+              <a:rPr lang="es-AR" sz="1600" dirty="0"/>
+              <a:t>. Esta herramienta de versionado es la más avanzada de su clase. Es distribuido, cada desarrollador tiene su propia copia del </a:t>
+            </a:r>
+            <a:r>
+              <a:rPr lang="es-AR" sz="1600" dirty="0" smtClean="0"/>
+              <a:t>código.</a:t>
+            </a:r>
+          </a:p>
+          <a:p>
+            <a:pPr lvl="1"/>
+            <a:r>
+              <a:rPr lang="es-AR" sz="1600" b="1" dirty="0" smtClean="0"/>
+              <a:t>Documentación</a:t>
+            </a:r>
+            <a:r>
+              <a:rPr lang="es-AR" sz="1600" dirty="0"/>
+              <a:t>: Se proporcionará al equipo una herramienta para el intercambio de información rápida e informal, </a:t>
+            </a:r>
+            <a:r>
+              <a:rPr lang="es-AR" sz="1600" dirty="0" err="1"/>
+              <a:t>Twiki</a:t>
+            </a:r>
+            <a:r>
+              <a:rPr lang="es-AR" sz="1600" dirty="0"/>
+              <a:t>.</a:t>
+            </a:r>
+          </a:p>
+          <a:p>
+            <a:pPr lvl="1"/>
+            <a:r>
+              <a:rPr lang="es-AR" sz="1600" b="1" dirty="0"/>
+              <a:t>BTS</a:t>
+            </a:r>
+            <a:r>
+              <a:rPr lang="es-AR" sz="1600" dirty="0"/>
+              <a:t>: El Bug tracking </a:t>
+            </a:r>
+            <a:r>
+              <a:rPr lang="es-AR" sz="1600" dirty="0" err="1"/>
+              <a:t>system</a:t>
+            </a:r>
+            <a:r>
+              <a:rPr lang="es-AR" sz="1600" dirty="0"/>
+              <a:t> seleccionado es Mantis.</a:t>
+            </a:r>
+          </a:p>
+          <a:p>
+            <a:pPr lvl="1"/>
+            <a:r>
+              <a:rPr lang="es-AR" sz="1600" b="1" dirty="0" err="1"/>
+              <a:t>Maven</a:t>
+            </a:r>
+            <a:r>
+              <a:rPr lang="es-AR" sz="1600" dirty="0"/>
+              <a:t>: Se instalará un repositorio local de </a:t>
+            </a:r>
+            <a:r>
+              <a:rPr lang="es-AR" sz="1600" dirty="0" err="1"/>
+              <a:t>Jakarta</a:t>
+            </a:r>
+            <a:r>
+              <a:rPr lang="es-AR" sz="1600" dirty="0"/>
+              <a:t> </a:t>
+            </a:r>
+            <a:r>
+              <a:rPr lang="es-AR" sz="1600" dirty="0" err="1"/>
+              <a:t>Maven</a:t>
+            </a:r>
+            <a:r>
+              <a:rPr lang="es-AR" sz="1600" dirty="0"/>
+              <a:t>, para proveer paquetes de librerías y los paquetes propios de la aplicación</a:t>
+            </a:r>
+            <a:r>
+              <a:rPr lang="es-AR" sz="1600" dirty="0" smtClean="0"/>
+              <a:t>.</a:t>
+            </a:r>
+            <a:endParaRPr lang="es-AR" sz="1600" dirty="0"/>
+          </a:p>
+          <a:p>
+            <a:endParaRPr lang="es-AR" dirty="0"/>
+          </a:p>
+        </p:txBody>
+      </p:sp>
+      <p:sp>
+        <p:nvSpPr>
+          <p:cNvPr id="5" name="Text Placeholder 3"/>
+          <p:cNvSpPr>
+            <a:spLocks noGrp="1"/>
+          </p:cNvSpPr>
+          <p:nvPr>
+            <p:ph type="body" sz="quarter" idx="13"/>
+          </p:nvPr>
+        </p:nvSpPr>
+        <p:spPr>
+          <a:xfrm>
+            <a:off x="475488" y="640080"/>
+            <a:ext cx="8449056" cy="228600"/>
+          </a:xfrm>
+        </p:spPr>
+        <p:txBody>
+          <a:bodyPr/>
+          <a:lstStyle/>
+          <a:p>
+            <a:r>
+              <a:rPr lang="es-AR" dirty="0" smtClean="0"/>
+              <a:t>Contara con 2 Servidores Principales</a:t>
+            </a:r>
+            <a:endParaRPr lang="es-AR" dirty="0"/>
+          </a:p>
+        </p:txBody>
+      </p:sp>
+    </p:spTree>
+    <p:extLst>
+      <p:ext uri="{BB962C8B-B14F-4D97-AF65-F5344CB8AC3E}">
+        <p14:creationId xmlns:p14="http://schemas.microsoft.com/office/powerpoint/2010/main" val="2942693383"/>
+      </p:ext>
+    </p:extLst>
+  </p:cSld>
+  <p:clrMapOvr>
+    <a:masterClrMapping/>
+  </p:clrMapOvr>
+</p:sld>
+</file>
+
+<file path=ppt/slides/slide12.xml><?xml version="1.0" encoding="utf-8"?>
+<p:sld xmlns:a="http://schemas.openxmlformats.org/drawingml/2006/main" xmlns:r="http://schemas.openxmlformats.org/officeDocument/2006/relationships" xmlns:p="http://schemas.openxmlformats.org/presentationml/2006/main">
+  <p:cSld>
+    <p:spTree>
+      <p:nvGrpSpPr>
+        <p:cNvPr id="1" name=""/>
+        <p:cNvGrpSpPr/>
+        <p:nvPr/>
+      </p:nvGrpSpPr>
+      <p:grpSpPr>
+        <a:xfrm>
+          <a:off x="0" y="0"/>
+          <a:ext cx="0" cy="0"/>
+          <a:chOff x="0" y="0"/>
+          <a:chExt cx="0" cy="0"/>
+        </a:xfrm>
+      </p:grpSpPr>
+      <p:sp>
+        <p:nvSpPr>
+          <p:cNvPr id="2" name="Title 1"/>
+          <p:cNvSpPr>
+            <a:spLocks noGrp="1"/>
+          </p:cNvSpPr>
+          <p:nvPr>
+            <p:ph type="title"/>
+          </p:nvPr>
+        </p:nvSpPr>
+        <p:spPr/>
+        <p:txBody>
+          <a:bodyPr/>
+          <a:lstStyle/>
+          <a:p>
+            <a:r>
+              <a:rPr lang="es-AR" dirty="0"/>
+              <a:t>Infraestructura Interna - Servidores</a:t>
+            </a:r>
+          </a:p>
+        </p:txBody>
+      </p:sp>
+      <p:sp>
+        <p:nvSpPr>
+          <p:cNvPr id="3" name="Content Placeholder 2"/>
+          <p:cNvSpPr>
+            <a:spLocks noGrp="1"/>
+          </p:cNvSpPr>
+          <p:nvPr>
+            <p:ph idx="1"/>
+          </p:nvPr>
+        </p:nvSpPr>
+        <p:spPr>
+          <a:xfrm>
+            <a:off x="722313" y="1052735"/>
+            <a:ext cx="7888287" cy="4967065"/>
+          </a:xfrm>
+        </p:spPr>
+        <p:txBody>
+          <a:bodyPr/>
+          <a:lstStyle/>
+          <a:p>
+            <a:pPr marL="0" indent="0" algn="ctr">
+              <a:buNone/>
+            </a:pPr>
+            <a:r>
+              <a:rPr lang="es-ES_tradnl" sz="1600" b="1" dirty="0"/>
+              <a:t>Servidor </a:t>
+            </a:r>
+            <a:r>
+              <a:rPr lang="es-ES_tradnl" sz="1600" b="1" dirty="0" smtClean="0"/>
+              <a:t>2: Ambiente Producción </a:t>
+            </a:r>
+            <a:r>
+              <a:rPr lang="es-ES_tradnl" sz="1600" b="1" dirty="0" err="1" smtClean="0"/>
+              <a:t>Virtualizado</a:t>
+            </a:r>
+            <a:endParaRPr lang="es-ES_tradnl" sz="1600" b="1" dirty="0" smtClean="0"/>
+          </a:p>
+          <a:p>
+            <a:pPr marL="0" indent="0" algn="ctr">
+              <a:buNone/>
+            </a:pPr>
+            <a:endParaRPr lang="es-AR" sz="1600" dirty="0"/>
+          </a:p>
+          <a:p>
+            <a:r>
+              <a:rPr lang="es-ES_tradnl" sz="1600" b="1" u="sng" dirty="0"/>
+              <a:t>Roles:</a:t>
+            </a:r>
+            <a:r>
+              <a:rPr lang="es-ES_tradnl" sz="1600" dirty="0"/>
+              <a:t> Entorno de Desarrollo mediante virtualización </a:t>
+            </a:r>
+            <a:r>
+              <a:rPr lang="es-ES_tradnl" sz="1600" dirty="0" smtClean="0"/>
+              <a:t>con </a:t>
+            </a:r>
+            <a:r>
+              <a:rPr lang="es-ES_tradnl" sz="1600" b="1" dirty="0" smtClean="0"/>
+              <a:t>XEN</a:t>
+            </a:r>
+            <a:r>
+              <a:rPr lang="es-ES_tradnl" sz="1600" dirty="0" smtClean="0"/>
+              <a:t>.</a:t>
+            </a:r>
+            <a:endParaRPr lang="es-AR" sz="1600" dirty="0"/>
+          </a:p>
+          <a:p>
+            <a:pPr lvl="1"/>
+            <a:r>
+              <a:rPr lang="es-ES_tradnl" sz="1600" dirty="0"/>
+              <a:t>Se configurarán varias máquinas virtuales para crear ambientes de desarrollo y </a:t>
+            </a:r>
+            <a:r>
+              <a:rPr lang="es-ES_tradnl" sz="1600" dirty="0" err="1"/>
+              <a:t>testing</a:t>
+            </a:r>
+            <a:r>
+              <a:rPr lang="es-ES_tradnl" sz="1600" dirty="0"/>
+              <a:t>. </a:t>
+            </a:r>
+            <a:endParaRPr lang="es-ES_tradnl" sz="1600" dirty="0" smtClean="0"/>
+          </a:p>
+          <a:p>
+            <a:pPr marL="228600" lvl="1" indent="0">
+              <a:buNone/>
+            </a:pPr>
+            <a:endParaRPr lang="es-ES_tradnl" sz="1600" dirty="0" smtClean="0"/>
+          </a:p>
+          <a:p>
+            <a:pPr lvl="1"/>
+            <a:r>
+              <a:rPr lang="es-AR" sz="1600" b="1" dirty="0" smtClean="0"/>
+              <a:t>Ambiente </a:t>
+            </a:r>
+            <a:r>
+              <a:rPr lang="es-AR" sz="1600" b="1" dirty="0"/>
+              <a:t>de Desarrollo</a:t>
+            </a:r>
+            <a:r>
+              <a:rPr lang="es-AR" sz="1600" dirty="0"/>
+              <a:t>: Se mantendrá un ambiente de aplicaciones similar al productivo pero que estará a disposición de los desarrolladores para probar el sistema.</a:t>
+            </a:r>
+          </a:p>
+          <a:p>
+            <a:pPr lvl="1"/>
+            <a:r>
+              <a:rPr lang="es-AR" sz="1600" b="1" dirty="0"/>
+              <a:t>Ambiente de QA</a:t>
+            </a:r>
+            <a:r>
+              <a:rPr lang="es-AR" sz="1600" dirty="0"/>
+              <a:t>: Similar al de desarrollo pero se utilizará para el </a:t>
+            </a:r>
+            <a:r>
+              <a:rPr lang="es-AR" sz="1600" dirty="0" err="1"/>
+              <a:t>testing</a:t>
+            </a:r>
+            <a:r>
+              <a:rPr lang="es-AR" sz="1600" dirty="0"/>
+              <a:t> integral de la aplicación y deberá mantenerse estable, las versiones que pasen los test en este ambiente se consideraran lo suficientemente estable para ser instalados en producción.</a:t>
+            </a:r>
+          </a:p>
+          <a:p>
+            <a:pPr lvl="1"/>
+            <a:r>
+              <a:rPr lang="es-AR" sz="1600" b="1" dirty="0"/>
+              <a:t>Base de datos</a:t>
+            </a:r>
+            <a:r>
+              <a:rPr lang="es-AR" sz="1600" dirty="0"/>
+              <a:t>: Se instalará la misma base de datos seleccionada para el sistema. Se utilizará para desarrollo y </a:t>
+            </a:r>
+            <a:r>
+              <a:rPr lang="es-AR" sz="1600" dirty="0" err="1"/>
+              <a:t>testing</a:t>
+            </a:r>
+            <a:r>
+              <a:rPr lang="es-AR" sz="1600" dirty="0" smtClean="0"/>
+              <a:t>.</a:t>
+            </a:r>
+            <a:endParaRPr lang="es-AR" sz="1600" dirty="0"/>
+          </a:p>
+          <a:p>
+            <a:endParaRPr lang="es-AR" dirty="0"/>
+          </a:p>
+        </p:txBody>
+      </p:sp>
+    </p:spTree>
+    <p:extLst>
+      <p:ext uri="{BB962C8B-B14F-4D97-AF65-F5344CB8AC3E}">
+        <p14:creationId xmlns:p14="http://schemas.microsoft.com/office/powerpoint/2010/main" val="3786510650"/>
+      </p:ext>
+    </p:extLst>
+  </p:cSld>
+  <p:clrMapOvr>
+    <a:masterClrMapping/>
+  </p:clrMapOvr>
+</p:sld>
+</file>
+
+<file path=ppt/slides/slide13.xml><?xml version="1.0" encoding="utf-8"?>
+<p:sld xmlns:a="http://schemas.openxmlformats.org/drawingml/2006/main" xmlns:r="http://schemas.openxmlformats.org/officeDocument/2006/relationships" xmlns:p="http://schemas.openxmlformats.org/presentationml/2006/main">
+  <p:cSld>
+    <p:spTree>
+      <p:nvGrpSpPr>
+        <p:cNvPr id="1" name=""/>
+        <p:cNvGrpSpPr/>
+        <p:nvPr/>
+      </p:nvGrpSpPr>
+      <p:grpSpPr>
+        <a:xfrm>
+          <a:off x="0" y="0"/>
+          <a:ext cx="0" cy="0"/>
+          <a:chOff x="0" y="0"/>
+          <a:chExt cx="0" cy="0"/>
+        </a:xfrm>
+      </p:grpSpPr>
+      <p:sp>
+        <p:nvSpPr>
+          <p:cNvPr id="2" name="Title 1"/>
+          <p:cNvSpPr>
+            <a:spLocks noGrp="1"/>
+          </p:cNvSpPr>
+          <p:nvPr>
+            <p:ph type="title"/>
+          </p:nvPr>
+        </p:nvSpPr>
+        <p:spPr/>
+        <p:txBody>
+          <a:bodyPr/>
+          <a:lstStyle/>
+          <a:p>
+            <a:r>
+              <a:rPr lang="es-AR" dirty="0" err="1" smtClean="0"/>
+              <a:t>Pc´s</a:t>
+            </a:r>
+            <a:r>
+              <a:rPr lang="es-AR" dirty="0" smtClean="0"/>
+              <a:t> Para Desarrollo</a:t>
+            </a:r>
+            <a:endParaRPr lang="es-AR" dirty="0"/>
+          </a:p>
+        </p:txBody>
+      </p:sp>
+      <p:sp>
+        <p:nvSpPr>
+          <p:cNvPr id="3" name="Content Placeholder 2"/>
+          <p:cNvSpPr>
+            <a:spLocks noGrp="1"/>
+          </p:cNvSpPr>
+          <p:nvPr>
+            <p:ph idx="1"/>
+          </p:nvPr>
+        </p:nvSpPr>
+        <p:spPr>
+          <a:xfrm>
+            <a:off x="722313" y="980729"/>
+            <a:ext cx="7888287" cy="5039072"/>
+          </a:xfrm>
+        </p:spPr>
+        <p:txBody>
+          <a:bodyPr/>
+          <a:lstStyle/>
+          <a:p>
+            <a:r>
+              <a:rPr lang="es-AR" dirty="0" smtClean="0"/>
+              <a:t>Serán necesarias 7 </a:t>
+            </a:r>
+            <a:r>
+              <a:rPr lang="es-AR" dirty="0" err="1" smtClean="0"/>
+              <a:t>pcs</a:t>
+            </a:r>
+            <a:r>
+              <a:rPr lang="es-AR" dirty="0" smtClean="0"/>
+              <a:t> para el equipo de trabajo y una notebook para el </a:t>
+            </a:r>
+            <a:r>
+              <a:rPr lang="es-AR" dirty="0" err="1" smtClean="0"/>
+              <a:t>lider</a:t>
+            </a:r>
+            <a:r>
+              <a:rPr lang="es-AR" dirty="0" smtClean="0"/>
+              <a:t> de proyecto</a:t>
+            </a:r>
+          </a:p>
+          <a:p>
+            <a:r>
+              <a:rPr lang="es-AR" dirty="0" smtClean="0"/>
+              <a:t>Todas </a:t>
+            </a:r>
+            <a:r>
+              <a:rPr lang="es-AR" dirty="0" err="1" smtClean="0"/>
+              <a:t>Estaran</a:t>
+            </a:r>
+            <a:r>
+              <a:rPr lang="es-AR" dirty="0" smtClean="0"/>
+              <a:t> provistas de </a:t>
+            </a:r>
+            <a:r>
+              <a:rPr lang="es-AR" b="1" dirty="0"/>
+              <a:t>Ubuntu </a:t>
+            </a:r>
+            <a:r>
+              <a:rPr lang="es-AR" b="1" dirty="0" smtClean="0"/>
+              <a:t>Desktop </a:t>
+            </a:r>
+            <a:r>
+              <a:rPr lang="es-AR" b="1" dirty="0" err="1" smtClean="0"/>
+              <a:t>version</a:t>
+            </a:r>
+            <a:r>
+              <a:rPr lang="es-AR" b="1" dirty="0" smtClean="0"/>
+              <a:t> 10.4</a:t>
+            </a:r>
+            <a:endParaRPr lang="es-AR" dirty="0"/>
+          </a:p>
+          <a:p>
+            <a:endParaRPr lang="es-AR" dirty="0" smtClean="0"/>
+          </a:p>
+          <a:p>
+            <a:endParaRPr lang="es-AR" dirty="0"/>
+          </a:p>
+          <a:p>
+            <a:endParaRPr lang="es-AR" dirty="0" smtClean="0"/>
+          </a:p>
+          <a:p>
+            <a:pPr algn="ctr"/>
+            <a:r>
+              <a:rPr lang="es-AR" sz="2400" b="1" dirty="0" smtClean="0">
+                <a:solidFill>
+                  <a:srgbClr val="FF0000"/>
+                </a:solidFill>
+              </a:rPr>
+              <a:t>TABLA PONDERCION NOTEBOOKS???</a:t>
+            </a:r>
+            <a:endParaRPr lang="es-AR" sz="2400" b="1" dirty="0">
+              <a:solidFill>
+                <a:srgbClr val="FF0000"/>
+              </a:solidFill>
+            </a:endParaRPr>
+          </a:p>
+        </p:txBody>
+      </p:sp>
+    </p:spTree>
+    <p:extLst>
+      <p:ext uri="{BB962C8B-B14F-4D97-AF65-F5344CB8AC3E}">
+        <p14:creationId xmlns:p14="http://schemas.microsoft.com/office/powerpoint/2010/main" val="793879350"/>
+      </p:ext>
+    </p:extLst>
+  </p:cSld>
+  <p:clrMapOvr>
+    <a:masterClrMapping/>
+  </p:clrMapOvr>
+</p:sld>
+</file>
+
+<file path=ppt/slides/slide14.xml><?xml version="1.0" encoding="utf-8"?>
+<p:sld xmlns:a="http://schemas.openxmlformats.org/drawingml/2006/main" xmlns:r="http://schemas.openxmlformats.org/officeDocument/2006/relationships" xmlns:p="http://schemas.openxmlformats.org/presentationml/2006/main">
+  <p:cSld>
+    <p:spTree>
+      <p:nvGrpSpPr>
+        <p:cNvPr id="1" name=""/>
+        <p:cNvGrpSpPr/>
+        <p:nvPr/>
+      </p:nvGrpSpPr>
+      <p:grpSpPr>
+        <a:xfrm>
+          <a:off x="0" y="0"/>
+          <a:ext cx="0" cy="0"/>
+          <a:chOff x="0" y="0"/>
+          <a:chExt cx="0" cy="0"/>
+        </a:xfrm>
+      </p:grpSpPr>
+      <p:sp>
+        <p:nvSpPr>
+          <p:cNvPr id="2" name="Title 1"/>
+          <p:cNvSpPr>
+            <a:spLocks noGrp="1"/>
+          </p:cNvSpPr>
+          <p:nvPr>
+            <p:ph type="title"/>
+          </p:nvPr>
+        </p:nvSpPr>
+        <p:spPr/>
+        <p:txBody>
+          <a:bodyPr/>
+          <a:lstStyle/>
+          <a:p>
+            <a:r>
+              <a:rPr lang="es-AR" dirty="0" smtClean="0"/>
+              <a:t>Lenguaje </a:t>
+            </a:r>
+            <a:r>
+              <a:rPr lang="es-AR" dirty="0" err="1" smtClean="0"/>
+              <a:t>Programacion</a:t>
+            </a:r>
+            <a:endParaRPr lang="es-AR" dirty="0"/>
+          </a:p>
+        </p:txBody>
+      </p:sp>
+      <p:sp>
+        <p:nvSpPr>
+          <p:cNvPr id="3" name="Content Placeholder 2"/>
+          <p:cNvSpPr>
+            <a:spLocks noGrp="1"/>
+          </p:cNvSpPr>
+          <p:nvPr>
+            <p:ph idx="1"/>
+          </p:nvPr>
+        </p:nvSpPr>
+        <p:spPr>
+          <a:xfrm>
+            <a:off x="395536" y="908720"/>
+            <a:ext cx="8496943" cy="5256583"/>
+          </a:xfrm>
+        </p:spPr>
+        <p:txBody>
+          <a:bodyPr/>
+          <a:lstStyle/>
+          <a:p>
+            <a:r>
+              <a:rPr lang="es-AR" dirty="0" smtClean="0"/>
+              <a:t>Tanto </a:t>
+            </a:r>
+            <a:r>
+              <a:rPr lang="es-AR" dirty="0"/>
+              <a:t>el cliente desktop como el </a:t>
+            </a:r>
+            <a:r>
+              <a:rPr lang="es-AR" dirty="0" err="1"/>
+              <a:t>backend</a:t>
+            </a:r>
+            <a:r>
+              <a:rPr lang="es-AR" dirty="0"/>
+              <a:t> y la aplicación web serán desarrollados en </a:t>
+            </a:r>
+            <a:r>
+              <a:rPr lang="es-AR" b="1" dirty="0" smtClean="0"/>
+              <a:t>Java</a:t>
+            </a:r>
+          </a:p>
+          <a:p>
+            <a:pPr marL="0" indent="0">
+              <a:buNone/>
+            </a:pPr>
+            <a:endParaRPr lang="es-AR" b="1" dirty="0" smtClean="0"/>
+          </a:p>
+          <a:p>
+            <a:pPr lvl="1"/>
+            <a:r>
+              <a:rPr lang="es-ES_tradnl" b="1" u="sng" dirty="0" smtClean="0"/>
+              <a:t>Amplia </a:t>
+            </a:r>
+            <a:r>
+              <a:rPr lang="es-ES_tradnl" b="1" u="sng" dirty="0"/>
+              <a:t>disponibilidad de recursos capacitados</a:t>
+            </a:r>
+            <a:r>
+              <a:rPr lang="es-ES_tradnl" dirty="0"/>
+              <a:t>: Es uno de los lenguajes más utilizados y es fácil encontrar personal con experiencia en el mercado. </a:t>
+            </a:r>
+            <a:r>
+              <a:rPr lang="es-AR" dirty="0"/>
+              <a:t>No existe la necesidad de capacitar ingresantes. </a:t>
+            </a:r>
+            <a:r>
+              <a:rPr lang="es-AR" dirty="0" smtClean="0"/>
+              <a:t>E</a:t>
+            </a:r>
+            <a:r>
+              <a:rPr lang="es-ES_tradnl" dirty="0" smtClean="0"/>
+              <a:t>l </a:t>
+            </a:r>
+            <a:r>
+              <a:rPr lang="es-ES_tradnl" dirty="0"/>
+              <a:t>personal capacitado es más económico que en otros lenguajes más específicos. </a:t>
+            </a:r>
+            <a:endParaRPr lang="es-AR" dirty="0"/>
+          </a:p>
+          <a:p>
+            <a:pPr lvl="1"/>
+            <a:r>
+              <a:rPr lang="es-ES_tradnl" b="1" u="sng" dirty="0" smtClean="0"/>
+              <a:t>Madurez </a:t>
+            </a:r>
+            <a:r>
+              <a:rPr lang="es-ES_tradnl" b="1" u="sng" dirty="0"/>
+              <a:t>y soporte</a:t>
+            </a:r>
+            <a:r>
+              <a:rPr lang="es-ES_tradnl" dirty="0"/>
+              <a:t>: Está establecido en el mercado y fue desarrollado a través de los años por </a:t>
+            </a:r>
+            <a:r>
+              <a:rPr lang="es-ES_tradnl" dirty="0" err="1"/>
+              <a:t>Sun</a:t>
+            </a:r>
+            <a:r>
+              <a:rPr lang="es-ES_tradnl" dirty="0"/>
+              <a:t>, ahora por un comité formado por importantes empresas y siempre se mantuvo la compatibilidad entre versiones.</a:t>
+            </a:r>
+            <a:endParaRPr lang="es-AR" dirty="0"/>
+          </a:p>
+          <a:p>
+            <a:pPr lvl="1"/>
+            <a:r>
+              <a:rPr lang="es-ES_tradnl" b="1" u="sng" dirty="0"/>
+              <a:t>Disponibilidad de </a:t>
+            </a:r>
+            <a:r>
+              <a:rPr lang="es-ES_tradnl" b="1" u="sng" dirty="0" err="1"/>
+              <a:t>Frameworks</a:t>
+            </a:r>
+            <a:r>
+              <a:rPr lang="es-ES_tradnl" b="1" u="sng" dirty="0"/>
+              <a:t> y librerías</a:t>
+            </a:r>
+            <a:r>
+              <a:rPr lang="es-ES_tradnl" dirty="0"/>
+              <a:t>: Existe una vasta selección de herramientas maduras para el desarrollado, tanto para la parte de servidor como de presentación. </a:t>
+            </a:r>
+            <a:r>
+              <a:rPr lang="es-ES_tradnl" dirty="0" smtClean="0"/>
+              <a:t>R</a:t>
+            </a:r>
+            <a:r>
+              <a:rPr lang="es-AR" dirty="0" smtClean="0"/>
+              <a:t>educe </a:t>
+            </a:r>
+            <a:r>
+              <a:rPr lang="es-AR" dirty="0"/>
+              <a:t>el tiempo y los riesgos.</a:t>
+            </a:r>
+          </a:p>
+          <a:p>
+            <a:pPr lvl="1"/>
+            <a:r>
+              <a:rPr lang="es-ES_tradnl" b="1" u="sng" dirty="0"/>
+              <a:t>Multiplataforma</a:t>
+            </a:r>
+            <a:r>
+              <a:rPr lang="es-ES_tradnl" dirty="0"/>
+              <a:t>: Se consideró importante para el desarrollo de este sistema la independencia de plataforma, la capacidad de remplazar o combinar diferentes sistemas operativos sin ningún tipo de desarrollo. </a:t>
+            </a:r>
+            <a:endParaRPr lang="es-ES_tradnl" dirty="0" smtClean="0"/>
+          </a:p>
+          <a:p>
+            <a:pPr lvl="1"/>
+            <a:r>
+              <a:rPr lang="es-ES_tradnl" b="1" u="sng" dirty="0" smtClean="0"/>
+              <a:t>Performance</a:t>
+            </a:r>
+            <a:r>
+              <a:rPr lang="es-ES_tradnl" dirty="0"/>
+              <a:t>: </a:t>
+            </a:r>
+            <a:r>
+              <a:rPr lang="es-ES_tradnl" dirty="0" smtClean="0"/>
+              <a:t>Se compila </a:t>
+            </a:r>
+            <a:r>
+              <a:rPr lang="es-ES_tradnl" dirty="0"/>
+              <a:t>a </a:t>
+            </a:r>
+            <a:r>
+              <a:rPr lang="es-ES_tradnl" dirty="0" err="1"/>
+              <a:t>bytecode</a:t>
+            </a:r>
+            <a:r>
+              <a:rPr lang="es-ES_tradnl" dirty="0"/>
+              <a:t> y es ejecutado por una máquina virtual. </a:t>
+            </a:r>
+            <a:r>
+              <a:rPr lang="es-AR" dirty="0"/>
+              <a:t>Esta máquina virtual es la Java </a:t>
+            </a:r>
+            <a:r>
+              <a:rPr lang="es-AR" i="1" dirty="0" err="1"/>
+              <a:t>HotSpot</a:t>
+            </a:r>
+            <a:r>
+              <a:rPr lang="es-AR" i="1" dirty="0"/>
+              <a:t> Server VM </a:t>
+            </a:r>
+            <a:r>
+              <a:rPr lang="es-AR" dirty="0"/>
+              <a:t>que tiene la funcionalidad </a:t>
+            </a:r>
+            <a:r>
+              <a:rPr lang="es-AR" i="1" dirty="0"/>
+              <a:t>JIT (</a:t>
+            </a:r>
+            <a:r>
+              <a:rPr lang="es-AR" i="1" dirty="0" err="1"/>
+              <a:t>Just</a:t>
+            </a:r>
+            <a:r>
+              <a:rPr lang="es-AR" i="1" dirty="0"/>
+              <a:t> in time) </a:t>
+            </a:r>
+            <a:r>
+              <a:rPr lang="es-AR" i="1" dirty="0" err="1" smtClean="0"/>
+              <a:t>compilation</a:t>
+            </a:r>
+            <a:r>
+              <a:rPr lang="es-AR" i="1" dirty="0" smtClean="0"/>
+              <a:t>. E</a:t>
+            </a:r>
+            <a:r>
+              <a:rPr lang="es-AR" dirty="0" smtClean="0"/>
+              <a:t>sta </a:t>
+            </a:r>
+            <a:r>
+              <a:rPr lang="es-AR" dirty="0"/>
+              <a:t>capacidad analiza el código que se ejecuta reiteradamente y lo optimiza en memoria haciendo las sucesivas ejecuciones más </a:t>
+            </a:r>
+            <a:r>
+              <a:rPr lang="es-AR" dirty="0" smtClean="0"/>
+              <a:t>rápidas</a:t>
+            </a:r>
+          </a:p>
+          <a:p>
+            <a:pPr lvl="1"/>
+            <a:r>
+              <a:rPr lang="es-ES_tradnl" b="1" u="sng" dirty="0" smtClean="0"/>
+              <a:t>Costos</a:t>
+            </a:r>
+            <a:r>
+              <a:rPr lang="es-ES_tradnl" dirty="0"/>
+              <a:t>: No posee costos de </a:t>
+            </a:r>
+            <a:r>
+              <a:rPr lang="es-ES_tradnl" dirty="0" smtClean="0"/>
+              <a:t>licencias.</a:t>
+            </a:r>
+            <a:endParaRPr lang="es-AR" dirty="0"/>
+          </a:p>
+        </p:txBody>
+      </p:sp>
+    </p:spTree>
+    <p:extLst>
+      <p:ext uri="{BB962C8B-B14F-4D97-AF65-F5344CB8AC3E}">
+        <p14:creationId xmlns:p14="http://schemas.microsoft.com/office/powerpoint/2010/main" val="1759990106"/>
+      </p:ext>
+    </p:extLst>
+  </p:cSld>
+  <p:clrMapOvr>
+    <a:masterClrMapping/>
+  </p:clrMapOvr>
+</p:sld>
+</file>
+
+<file path=ppt/slides/slide15.xml><?xml version="1.0" encoding="utf-8"?>
+<p:sld xmlns:a="http://schemas.openxmlformats.org/drawingml/2006/main" xmlns:r="http://schemas.openxmlformats.org/officeDocument/2006/relationships" xmlns:p="http://schemas.openxmlformats.org/presentationml/2006/main">
+  <p:cSld>
+    <p:spTree>
+      <p:nvGrpSpPr>
+        <p:cNvPr id="1" name=""/>
+        <p:cNvGrpSpPr/>
+        <p:nvPr/>
+      </p:nvGrpSpPr>
+      <p:grpSpPr>
+        <a:xfrm>
+          <a:off x="0" y="0"/>
+          <a:ext cx="0" cy="0"/>
+          <a:chOff x="0" y="0"/>
+          <a:chExt cx="0" cy="0"/>
+        </a:xfrm>
+      </p:grpSpPr>
+      <p:sp>
+        <p:nvSpPr>
+          <p:cNvPr id="2" name="Title 1"/>
+          <p:cNvSpPr>
+            <a:spLocks noGrp="1"/>
+          </p:cNvSpPr>
+          <p:nvPr>
+            <p:ph type="title"/>
+          </p:nvPr>
+        </p:nvSpPr>
+        <p:spPr/>
+        <p:txBody>
+          <a:bodyPr/>
+          <a:lstStyle/>
+          <a:p>
+            <a:r>
+              <a:rPr lang="es-AR" dirty="0" smtClean="0"/>
+              <a:t>Principales </a:t>
+            </a:r>
+            <a:r>
+              <a:rPr lang="es-AR" dirty="0" err="1" smtClean="0"/>
+              <a:t>Tecnologias</a:t>
+            </a:r>
+            <a:endParaRPr lang="es-AR" dirty="0"/>
+          </a:p>
+        </p:txBody>
+      </p:sp>
+      <p:sp>
+        <p:nvSpPr>
+          <p:cNvPr id="3" name="Content Placeholder 2"/>
+          <p:cNvSpPr>
+            <a:spLocks noGrp="1"/>
+          </p:cNvSpPr>
+          <p:nvPr>
+            <p:ph idx="1"/>
+          </p:nvPr>
+        </p:nvSpPr>
+        <p:spPr>
+          <a:xfrm>
+            <a:off x="611560" y="908721"/>
+            <a:ext cx="8280919" cy="5111080"/>
+          </a:xfrm>
+        </p:spPr>
+        <p:txBody>
+          <a:bodyPr/>
+          <a:lstStyle/>
+          <a:p>
+            <a:r>
+              <a:rPr lang="es-ES_tradnl" b="1" u="sng" dirty="0"/>
+              <a:t>SWING</a:t>
+            </a:r>
+            <a:r>
+              <a:rPr lang="es-ES_tradnl" dirty="0"/>
+              <a:t>: Para la interfaz de usuario en el cliente </a:t>
+            </a:r>
+            <a:r>
+              <a:rPr lang="es-ES_tradnl" dirty="0" smtClean="0"/>
+              <a:t>desktop</a:t>
+            </a:r>
+            <a:r>
+              <a:rPr lang="es-AR" dirty="0" smtClean="0"/>
+              <a:t>. Independiente </a:t>
+            </a:r>
+            <a:r>
+              <a:rPr lang="es-AR" dirty="0"/>
+              <a:t>del sistema operativo y en las versiones más recientes imita el look and </a:t>
+            </a:r>
+            <a:r>
+              <a:rPr lang="es-AR" dirty="0" err="1"/>
+              <a:t>feel</a:t>
+            </a:r>
+            <a:r>
+              <a:rPr lang="es-AR" dirty="0"/>
+              <a:t> nativo.</a:t>
+            </a:r>
+            <a:br>
+              <a:rPr lang="es-AR" dirty="0"/>
+            </a:br>
+            <a:r>
+              <a:rPr lang="es-AR" dirty="0" smtClean="0"/>
+              <a:t>Las </a:t>
+            </a:r>
+            <a:r>
+              <a:rPr lang="es-AR" dirty="0"/>
+              <a:t>implementaciones de los componentes son cien por ciento java puro, lo cual permite adaptar fácilmente el aspecto y comportamiento de tales componentes, facilitando así el trabajo de los programadores, lo cual deriva en una mayor productividad</a:t>
+            </a:r>
+          </a:p>
+          <a:p>
+            <a:r>
+              <a:rPr lang="es-ES_tradnl" b="1" u="sng" dirty="0" err="1"/>
+              <a:t>Tomcat</a:t>
+            </a:r>
+            <a:r>
+              <a:rPr lang="es-ES_tradnl" dirty="0"/>
+              <a:t>: Para el </a:t>
+            </a:r>
+            <a:r>
+              <a:rPr lang="es-ES_tradnl" dirty="0" err="1"/>
+              <a:t>Application</a:t>
+            </a:r>
+            <a:r>
+              <a:rPr lang="es-ES_tradnl" dirty="0"/>
+              <a:t> </a:t>
+            </a:r>
+            <a:r>
+              <a:rPr lang="es-ES_tradnl" dirty="0" smtClean="0"/>
+              <a:t>server. N</a:t>
+            </a:r>
+            <a:r>
+              <a:rPr lang="es-AR" dirty="0" smtClean="0"/>
+              <a:t>os </a:t>
+            </a:r>
+            <a:r>
+              <a:rPr lang="es-AR" dirty="0"/>
+              <a:t>brinda un ambiente de ejecución controlado y configurable. Cada vez que una petición llegue al servidor se utilizará un </a:t>
+            </a:r>
+            <a:r>
+              <a:rPr lang="es-AR" dirty="0" err="1"/>
+              <a:t>thread</a:t>
+            </a:r>
+            <a:r>
+              <a:rPr lang="es-AR" dirty="0"/>
+              <a:t> para ejecutar la lógica de negocio. Manejar el ciclo de vida, la planificación y comunicación de </a:t>
+            </a:r>
+            <a:r>
+              <a:rPr lang="es-AR" dirty="0" err="1"/>
+              <a:t>threads</a:t>
+            </a:r>
+            <a:r>
+              <a:rPr lang="es-AR" dirty="0"/>
+              <a:t> es menos costoso que lo equivalente para  procesos, esto aliviará la carga del servidor y hará el sistema más </a:t>
+            </a:r>
+            <a:r>
+              <a:rPr lang="es-AR" dirty="0" err="1"/>
+              <a:t>performante</a:t>
+            </a:r>
+            <a:r>
+              <a:rPr lang="es-AR" dirty="0"/>
+              <a:t> y escalable.</a:t>
+            </a:r>
+          </a:p>
+          <a:p>
+            <a:r>
+              <a:rPr lang="es-ES_tradnl" b="1" u="sng" dirty="0"/>
+              <a:t>RMI</a:t>
+            </a:r>
+            <a:r>
+              <a:rPr lang="es-ES_tradnl" dirty="0"/>
+              <a:t>: La comunicación entre los clientes desktop y web con el </a:t>
+            </a:r>
+            <a:r>
+              <a:rPr lang="es-ES_tradnl" dirty="0" err="1"/>
+              <a:t>backend</a:t>
+            </a:r>
+            <a:r>
+              <a:rPr lang="es-ES_tradnl" dirty="0"/>
+              <a:t> será a través de RMI (</a:t>
+            </a:r>
+            <a:r>
+              <a:rPr lang="es-ES_tradnl" i="1" dirty="0" err="1"/>
+              <a:t>Remote</a:t>
+            </a:r>
+            <a:r>
+              <a:rPr lang="es-ES_tradnl" i="1" dirty="0"/>
+              <a:t> </a:t>
+            </a:r>
+            <a:r>
+              <a:rPr lang="es-ES_tradnl" i="1" dirty="0" err="1"/>
+              <a:t>Method</a:t>
+            </a:r>
+            <a:r>
+              <a:rPr lang="es-ES_tradnl" i="1" dirty="0"/>
+              <a:t> </a:t>
+            </a:r>
+            <a:r>
+              <a:rPr lang="es-ES_tradnl" i="1" dirty="0" err="1"/>
+              <a:t>Invocation</a:t>
+            </a:r>
+            <a:r>
+              <a:rPr lang="es-ES_tradnl" i="1" dirty="0"/>
+              <a:t>)</a:t>
+            </a:r>
+            <a:r>
+              <a:rPr lang="es-ES_tradnl" dirty="0"/>
+              <a:t>, este es un protocolo nativo de Java SE, es de simple aplicación y eficiente.</a:t>
+            </a:r>
+            <a:br>
+              <a:rPr lang="es-ES_tradnl" dirty="0"/>
+            </a:br>
+            <a:r>
+              <a:rPr lang="es-AR" dirty="0" smtClean="0"/>
+              <a:t>No </a:t>
+            </a:r>
+            <a:r>
+              <a:rPr lang="es-AR" dirty="0"/>
+              <a:t>necesitamos la ventaja de un web </a:t>
+            </a:r>
+            <a:r>
+              <a:rPr lang="es-AR" dirty="0" err="1"/>
+              <a:t>service</a:t>
+            </a:r>
+            <a:r>
+              <a:rPr lang="es-AR" dirty="0"/>
+              <a:t> (independizar el cliente del servidor) porque ambos serán desarrollados en java, lo que nos da la libertad de elegir un protocolo nativo.</a:t>
+            </a:r>
+          </a:p>
+          <a:p>
+            <a:r>
+              <a:rPr lang="es-ES_tradnl" b="1" u="sng" dirty="0" err="1"/>
+              <a:t>Hibernate</a:t>
+            </a:r>
+            <a:r>
+              <a:rPr lang="es-ES_tradnl" dirty="0"/>
+              <a:t>: Como </a:t>
+            </a:r>
+            <a:r>
+              <a:rPr lang="es-ES_tradnl" dirty="0" err="1"/>
+              <a:t>framework</a:t>
+            </a:r>
+            <a:r>
+              <a:rPr lang="es-ES_tradnl" dirty="0"/>
+              <a:t> de ORM para la persistencia. </a:t>
+            </a:r>
+            <a:r>
+              <a:rPr lang="es-AR" dirty="0"/>
+              <a:t>Se decidió utilizar una herramienta de ORM (</a:t>
+            </a:r>
+            <a:r>
+              <a:rPr lang="es-AR" dirty="0" err="1"/>
+              <a:t>object</a:t>
+            </a:r>
+            <a:r>
+              <a:rPr lang="es-AR" dirty="0"/>
+              <a:t> </a:t>
+            </a:r>
+            <a:r>
+              <a:rPr lang="es-AR" dirty="0" err="1"/>
+              <a:t>relational</a:t>
+            </a:r>
+            <a:r>
+              <a:rPr lang="es-AR" dirty="0"/>
+              <a:t> </a:t>
+            </a:r>
+            <a:r>
+              <a:rPr lang="es-AR" dirty="0" err="1"/>
+              <a:t>mapping</a:t>
+            </a:r>
+            <a:r>
+              <a:rPr lang="es-AR" dirty="0"/>
+              <a:t>) para reducir los problemas de desarrollo que acarrea lidiar con la integración de un lenguaje orientado a objetos y una base de datos relacional. </a:t>
+            </a:r>
+            <a:r>
+              <a:rPr lang="es-AR" dirty="0" err="1" smtClean="0"/>
+              <a:t>Hibernate</a:t>
+            </a:r>
+            <a:r>
+              <a:rPr lang="es-AR" dirty="0" smtClean="0"/>
+              <a:t> </a:t>
+            </a:r>
+            <a:r>
+              <a:rPr lang="es-AR" dirty="0"/>
+              <a:t>es el elegido por ser el más usado y probado, se sabe que es ampliamente configurable, de rendimiento aceptable y fácil aplicación. </a:t>
+            </a:r>
+            <a:endParaRPr lang="es-AR" dirty="0" smtClean="0"/>
+          </a:p>
+        </p:txBody>
+      </p:sp>
+    </p:spTree>
+    <p:extLst>
+      <p:ext uri="{BB962C8B-B14F-4D97-AF65-F5344CB8AC3E}">
+        <p14:creationId xmlns:p14="http://schemas.microsoft.com/office/powerpoint/2010/main" val="4000896319"/>
+      </p:ext>
+    </p:extLst>
+  </p:cSld>
+  <p:clrMapOvr>
+    <a:masterClrMapping/>
+  </p:clrMapOvr>
+</p:sld>
+</file>
+
+<file path=ppt/slides/slide16.xml><?xml version="1.0" encoding="utf-8"?>
+<p:sld xmlns:a="http://schemas.openxmlformats.org/drawingml/2006/main" xmlns:r="http://schemas.openxmlformats.org/officeDocument/2006/relationships" xmlns:p="http://schemas.openxmlformats.org/presentationml/2006/main">
+  <p:cSld>
+    <p:spTree>
+      <p:nvGrpSpPr>
+        <p:cNvPr id="1" name=""/>
+        <p:cNvGrpSpPr/>
+        <p:nvPr/>
+      </p:nvGrpSpPr>
+      <p:grpSpPr>
+        <a:xfrm>
+          <a:off x="0" y="0"/>
+          <a:ext cx="0" cy="0"/>
+          <a:chOff x="0" y="0"/>
+          <a:chExt cx="0" cy="0"/>
+        </a:xfrm>
+      </p:grpSpPr>
+      <p:sp>
+        <p:nvSpPr>
+          <p:cNvPr id="2" name="Title 1"/>
+          <p:cNvSpPr>
+            <a:spLocks noGrp="1"/>
+          </p:cNvSpPr>
+          <p:nvPr>
+            <p:ph type="title"/>
+          </p:nvPr>
+        </p:nvSpPr>
+        <p:spPr/>
+        <p:txBody>
+          <a:bodyPr/>
+          <a:lstStyle/>
+          <a:p>
+            <a:r>
+              <a:rPr lang="es-AR" dirty="0" smtClean="0"/>
+              <a:t>Base de Datos</a:t>
+            </a:r>
+            <a:endParaRPr lang="es-AR" dirty="0"/>
+          </a:p>
+        </p:txBody>
+      </p:sp>
+      <p:sp>
+        <p:nvSpPr>
+          <p:cNvPr id="3" name="Content Placeholder 2"/>
+          <p:cNvSpPr>
+            <a:spLocks noGrp="1"/>
+          </p:cNvSpPr>
+          <p:nvPr>
+            <p:ph idx="1"/>
+          </p:nvPr>
+        </p:nvSpPr>
+        <p:spPr/>
+        <p:txBody>
+          <a:bodyPr/>
+          <a:lstStyle/>
+          <a:p>
+            <a:endParaRPr lang="es-AR"/>
           </a:p>
         </p:txBody>
       </p:sp>
@@ -8534,6 +9950,10 @@
           <a:bodyPr/>
           <a:lstStyle/>
           <a:p>
+            <a:r>
+              <a:rPr lang="es-AR" dirty="0" smtClean="0"/>
+              <a:t>Motor Elegido</a:t>
+            </a:r>
             <a:endParaRPr lang="es-AR" dirty="0"/>
           </a:p>
         </p:txBody>
@@ -8541,7 +9961,102 @@
     </p:spTree>
     <p:extLst>
       <p:ext uri="{BB962C8B-B14F-4D97-AF65-F5344CB8AC3E}">
-        <p14:creationId xmlns:p14="http://schemas.microsoft.com/office/powerpoint/2010/main" val="2913108884"/>
+        <p14:creationId xmlns:p14="http://schemas.microsoft.com/office/powerpoint/2010/main" val="986913818"/>
+      </p:ext>
+    </p:extLst>
+  </p:cSld>
+  <p:clrMapOvr>
+    <a:masterClrMapping/>
+  </p:clrMapOvr>
+</p:sld>
+</file>
+
+<file path=ppt/slides/slide17.xml><?xml version="1.0" encoding="utf-8"?>
+<p:sld xmlns:a="http://schemas.openxmlformats.org/drawingml/2006/main" xmlns:r="http://schemas.openxmlformats.org/officeDocument/2006/relationships" xmlns:p="http://schemas.openxmlformats.org/presentationml/2006/main">
+  <p:cSld>
+    <p:spTree>
+      <p:nvGrpSpPr>
+        <p:cNvPr id="1" name=""/>
+        <p:cNvGrpSpPr/>
+        <p:nvPr/>
+      </p:nvGrpSpPr>
+      <p:grpSpPr>
+        <a:xfrm>
+          <a:off x="0" y="0"/>
+          <a:ext cx="0" cy="0"/>
+          <a:chOff x="0" y="0"/>
+          <a:chExt cx="0" cy="0"/>
+        </a:xfrm>
+      </p:grpSpPr>
+      <p:sp>
+        <p:nvSpPr>
+          <p:cNvPr id="2" name="Title 1"/>
+          <p:cNvSpPr>
+            <a:spLocks noGrp="1"/>
+          </p:cNvSpPr>
+          <p:nvPr>
+            <p:ph type="title"/>
+          </p:nvPr>
+        </p:nvSpPr>
+        <p:spPr/>
+        <p:txBody>
+          <a:bodyPr/>
+          <a:lstStyle/>
+          <a:p>
+            <a:r>
+              <a:rPr lang="es-AR" dirty="0" smtClean="0"/>
+              <a:t>Base de Datos</a:t>
+            </a:r>
+            <a:endParaRPr lang="es-AR" dirty="0"/>
+          </a:p>
+        </p:txBody>
+      </p:sp>
+      <p:sp>
+        <p:nvSpPr>
+          <p:cNvPr id="3" name="Content Placeholder 2"/>
+          <p:cNvSpPr>
+            <a:spLocks noGrp="1"/>
+          </p:cNvSpPr>
+          <p:nvPr>
+            <p:ph idx="1"/>
+          </p:nvPr>
+        </p:nvSpPr>
+        <p:spPr/>
+        <p:txBody>
+          <a:bodyPr/>
+          <a:lstStyle/>
+          <a:p>
+            <a:endParaRPr lang="es-AR" dirty="0"/>
+          </a:p>
+        </p:txBody>
+      </p:sp>
+      <p:sp>
+        <p:nvSpPr>
+          <p:cNvPr id="4" name="Text Placeholder 3"/>
+          <p:cNvSpPr>
+            <a:spLocks noGrp="1"/>
+          </p:cNvSpPr>
+          <p:nvPr>
+            <p:ph type="body" sz="quarter" idx="13"/>
+          </p:nvPr>
+        </p:nvSpPr>
+        <p:spPr/>
+        <p:txBody>
+          <a:bodyPr/>
+          <a:lstStyle/>
+          <a:p>
+            <a:r>
+              <a:rPr lang="es-AR" dirty="0" smtClean="0"/>
+              <a:t>Volumen</a:t>
+            </a:r>
+            <a:endParaRPr lang="es-AR" dirty="0"/>
+          </a:p>
+        </p:txBody>
+      </p:sp>
+    </p:spTree>
+    <p:extLst>
+      <p:ext uri="{BB962C8B-B14F-4D97-AF65-F5344CB8AC3E}">
+        <p14:creationId xmlns:p14="http://schemas.microsoft.com/office/powerpoint/2010/main" val="1539515098"/>
       </p:ext>
     </p:extLst>
   </p:cSld>
@@ -8661,20 +10176,6 @@
             </a:r>
           </a:p>
           <a:p>
-            <a:pPr eaLnBrk="1" hangingPunct="1">
-              <a:defRPr/>
-            </a:pPr>
-            <a:r>
-              <a:rPr lang="es-AR" dirty="0" smtClean="0"/>
-              <a:t>Arquitectura Detallada de </a:t>
-            </a:r>
-            <a:r>
-              <a:rPr lang="es-AR" dirty="0" err="1" smtClean="0"/>
-              <a:t>Produccion</a:t>
-            </a:r>
-            <a:endParaRPr lang="es-AR" dirty="0"/>
-          </a:p>
-          <a:p>
             <a:pPr marL="0" indent="0" eaLnBrk="1" hangingPunct="1">
               <a:buFontTx/>
               <a:buNone/>
@@ -8738,11 +10239,29 @@
             </a:r>
             <a:r>
               <a:rPr lang="es-AR" dirty="0" smtClean="0"/>
-              <a:t> Server</a:t>
+              <a:t> </a:t>
+            </a:r>
+            <a:r>
+              <a:rPr lang="es-AR" dirty="0" smtClean="0"/>
+              <a:t>Server</a:t>
             </a:r>
           </a:p>
           <a:p>
             <a:pPr eaLnBrk="1" hangingPunct="1">
+              <a:defRPr/>
+            </a:pPr>
+            <a:r>
+              <a:rPr lang="es-AR" dirty="0" err="1" smtClean="0"/>
+              <a:t>Integracion</a:t>
+            </a:r>
+            <a:r>
+              <a:rPr lang="es-AR" dirty="0" smtClean="0"/>
+              <a:t> con IVR</a:t>
+            </a:r>
+          </a:p>
+          <a:p>
+            <a:pPr marL="0" indent="0" eaLnBrk="1" hangingPunct="1">
+              <a:buNone/>
               <a:defRPr/>
             </a:pPr>
             <a:endParaRPr lang="es-AR" dirty="0" smtClean="0"/>
@@ -9916,7 +11435,7 @@
         </p:nvGraphicFramePr>
         <p:xfrm>
           <a:off x="2051720" y="1628800"/>
-          <a:ext cx="4464496" cy="1352487"/>
+          <a:ext cx="4464496" cy="1377950"/>
         </p:xfrm>
         <a:graphic>
           <a:graphicData uri="http://schemas.openxmlformats.org/drawingml/2006/table">
@@ -10278,7 +11797,7 @@
         </p:nvGraphicFramePr>
         <p:xfrm>
           <a:off x="2051720" y="3861048"/>
-          <a:ext cx="4464496" cy="1628077"/>
+          <a:ext cx="4464496" cy="1653540"/>
         </p:xfrm>
         <a:graphic>
           <a:graphicData uri="http://schemas.openxmlformats.org/drawingml/2006/table">

</xml_diff>

<commit_message>
retoco presupusto modifico ppt dos bolucedes en el .doc
</commit_message>
<xml_diff>
--- a/Presentacion.pptx
+++ b/Presentacion.pptx
@@ -5,7 +5,7 @@
     <p:sldMasterId id="2147483660" r:id="rId1"/>
   </p:sldMasterIdLst>
   <p:notesMasterIdLst>
-    <p:notesMasterId r:id="rId31"/>
+    <p:notesMasterId r:id="rId33"/>
   </p:notesMasterIdLst>
   <p:sldIdLst>
     <p:sldId id="256" r:id="rId2"/>
@@ -33,10 +33,12 @@
     <p:sldId id="271" r:id="rId24"/>
     <p:sldId id="278" r:id="rId25"/>
     <p:sldId id="279" r:id="rId26"/>
-    <p:sldId id="280" r:id="rId27"/>
-    <p:sldId id="281" r:id="rId28"/>
-    <p:sldId id="283" r:id="rId29"/>
-    <p:sldId id="282" r:id="rId30"/>
+    <p:sldId id="288" r:id="rId27"/>
+    <p:sldId id="289" r:id="rId28"/>
+    <p:sldId id="280" r:id="rId29"/>
+    <p:sldId id="281" r:id="rId30"/>
+    <p:sldId id="283" r:id="rId31"/>
+    <p:sldId id="282" r:id="rId32"/>
   </p:sldIdLst>
   <p:sldSz cx="9144000" cy="6858000" type="screen4x3"/>
   <p:notesSz cx="6858000" cy="9144000"/>
@@ -2934,7 +2936,7 @@
               <a:pPr>
                 <a:defRPr/>
               </a:pPr>
-              <a:t>9/19/2010</a:t>
+              <a:t>9/20/2010</a:t>
             </a:fld>
             <a:endParaRPr lang="en-US"/>
           </a:p>
@@ -3894,7 +3896,7 @@
               <a:pPr>
                 <a:defRPr/>
               </a:pPr>
-              <a:t>9/19/2010</a:t>
+              <a:t>9/20/2010</a:t>
             </a:fld>
             <a:endParaRPr lang="es-AR" dirty="0"/>
           </a:p>
@@ -13005,20 +13007,1904 @@
           <a:p>
             <a:r>
               <a:rPr lang="es-AR" dirty="0" smtClean="0"/>
-              <a:t>Costos Iniciales</a:t>
+              <a:t>RRHH</a:t>
             </a:r>
             <a:endParaRPr lang="es-AR" dirty="0"/>
           </a:p>
         </p:txBody>
       </p:sp>
+      <p:graphicFrame>
+        <p:nvGraphicFramePr>
+          <p:cNvPr id="5" name="Content Placeholder 4"/>
+          <p:cNvGraphicFramePr>
+            <a:graphicFrameLocks noGrp="1"/>
+          </p:cNvGraphicFramePr>
+          <p:nvPr>
+            <p:ph idx="1"/>
+            <p:extLst>
+              <p:ext uri="{D42A27DB-BD31-4B8C-83A1-F6EECF244321}">
+                <p14:modId xmlns:p14="http://schemas.microsoft.com/office/powerpoint/2010/main" val="688047208"/>
+              </p:ext>
+            </p:extLst>
+          </p:nvPr>
+        </p:nvGraphicFramePr>
+        <p:xfrm>
+          <a:off x="323529" y="1484784"/>
+          <a:ext cx="8136903" cy="2399214"/>
+        </p:xfrm>
+        <a:graphic>
+          <a:graphicData uri="http://schemas.openxmlformats.org/drawingml/2006/table">
+            <a:tbl>
+              <a:tblPr>
+                <a:tableStyleId>{5C22544A-7EE6-4342-B048-85BDC9FD1C3A}</a:tableStyleId>
+              </a:tblPr>
+              <a:tblGrid>
+                <a:gridCol w="1904971"/>
+                <a:gridCol w="654557"/>
+                <a:gridCol w="1168090"/>
+                <a:gridCol w="665285"/>
+                <a:gridCol w="598283"/>
+                <a:gridCol w="623898"/>
+                <a:gridCol w="623898"/>
+                <a:gridCol w="623898"/>
+                <a:gridCol w="623898"/>
+                <a:gridCol w="650125"/>
+              </a:tblGrid>
+              <a:tr h="100249">
+                <a:tc>
+                  <a:txBody>
+                    <a:bodyPr/>
+                    <a:lstStyle/>
+                    <a:p>
+                      <a:pPr algn="r" fontAlgn="b"/>
+                      <a:r>
+                        <a:rPr lang="es-AR" sz="1400" u="none" strike="noStrike">
+                          <a:effectLst/>
+                        </a:rPr>
+                        <a:t>Período</a:t>
+                      </a:r>
+                      <a:endParaRPr lang="es-AR" sz="1400" b="1" i="0" u="none" strike="noStrike">
+                        <a:solidFill>
+                          <a:srgbClr val="FFFFFF"/>
+                        </a:solidFill>
+                        <a:effectLst/>
+                        <a:latin typeface="Arial"/>
+                      </a:endParaRPr>
+                    </a:p>
+                  </a:txBody>
+                  <a:tcPr marL="5806" marR="5806" marT="5806" marB="0" anchor="b"/>
+                </a:tc>
+                <a:tc>
+                  <a:txBody>
+                    <a:bodyPr/>
+                    <a:lstStyle/>
+                    <a:p>
+                      <a:pPr algn="ctr" fontAlgn="b"/>
+                      <a:r>
+                        <a:rPr lang="es-AR" sz="1400" u="none" strike="noStrike">
+                          <a:effectLst/>
+                        </a:rPr>
+                        <a:t>Sueldo</a:t>
+                      </a:r>
+                      <a:endParaRPr lang="es-AR" sz="1400" b="1" i="0" u="none" strike="noStrike">
+                        <a:solidFill>
+                          <a:srgbClr val="FFFFFF"/>
+                        </a:solidFill>
+                        <a:effectLst/>
+                        <a:latin typeface="Arial"/>
+                      </a:endParaRPr>
+                    </a:p>
+                  </a:txBody>
+                  <a:tcPr marL="5806" marR="5806" marT="5806" marB="0" anchor="b"/>
+                </a:tc>
+                <a:tc>
+                  <a:txBody>
+                    <a:bodyPr/>
+                    <a:lstStyle/>
+                    <a:p>
+                      <a:pPr algn="ctr" fontAlgn="b"/>
+                      <a:r>
+                        <a:rPr lang="es-AR" sz="1400" u="none" strike="noStrike" dirty="0">
+                          <a:effectLst/>
+                        </a:rPr>
+                        <a:t>Costo Laboral </a:t>
+                      </a:r>
+                      <a:endParaRPr lang="es-AR" sz="1400" b="1" i="0" u="none" strike="noStrike" dirty="0">
+                        <a:solidFill>
+                          <a:srgbClr val="FFFFFF"/>
+                        </a:solidFill>
+                        <a:effectLst/>
+                        <a:latin typeface="Arial"/>
+                      </a:endParaRPr>
+                    </a:p>
+                  </a:txBody>
+                  <a:tcPr marL="5806" marR="5806" marT="5806" marB="0" anchor="b"/>
+                </a:tc>
+                <a:tc>
+                  <a:txBody>
+                    <a:bodyPr/>
+                    <a:lstStyle/>
+                    <a:p>
+                      <a:pPr algn="ctr" fontAlgn="b"/>
+                      <a:r>
+                        <a:rPr lang="es-AR" sz="1400" u="none" strike="noStrike">
+                          <a:effectLst/>
+                        </a:rPr>
+                        <a:t>Start-up</a:t>
+                      </a:r>
+                      <a:endParaRPr lang="es-AR" sz="1400" b="1" i="0" u="none" strike="noStrike">
+                        <a:solidFill>
+                          <a:srgbClr val="FFFFFF"/>
+                        </a:solidFill>
+                        <a:effectLst/>
+                        <a:latin typeface="Arial"/>
+                      </a:endParaRPr>
+                    </a:p>
+                  </a:txBody>
+                  <a:tcPr marL="5806" marR="5806" marT="5806" marB="0" anchor="b"/>
+                </a:tc>
+                <a:tc gridSpan="6">
+                  <a:txBody>
+                    <a:bodyPr/>
+                    <a:lstStyle/>
+                    <a:p>
+                      <a:pPr algn="ctr" fontAlgn="b"/>
+                      <a:r>
+                        <a:rPr lang="es-AR" sz="1400" u="none" strike="noStrike">
+                          <a:effectLst/>
+                        </a:rPr>
+                        <a:t>Proyecto</a:t>
+                      </a:r>
+                      <a:endParaRPr lang="es-AR" sz="1400" b="1" i="0" u="none" strike="noStrike">
+                        <a:solidFill>
+                          <a:srgbClr val="FFFFFF"/>
+                        </a:solidFill>
+                        <a:effectLst/>
+                        <a:latin typeface="Arial"/>
+                      </a:endParaRPr>
+                    </a:p>
+                  </a:txBody>
+                  <a:tcPr marL="5806" marR="5806" marT="5806" marB="0" anchor="b"/>
+                </a:tc>
+                <a:tc hMerge="1">
+                  <a:txBody>
+                    <a:bodyPr/>
+                    <a:lstStyle/>
+                    <a:p>
+                      <a:endParaRPr lang="es-AR"/>
+                    </a:p>
+                  </a:txBody>
+                  <a:tcPr/>
+                </a:tc>
+                <a:tc hMerge="1">
+                  <a:txBody>
+                    <a:bodyPr/>
+                    <a:lstStyle/>
+                    <a:p>
+                      <a:endParaRPr lang="es-AR"/>
+                    </a:p>
+                  </a:txBody>
+                  <a:tcPr/>
+                </a:tc>
+                <a:tc hMerge="1">
+                  <a:txBody>
+                    <a:bodyPr/>
+                    <a:lstStyle/>
+                    <a:p>
+                      <a:endParaRPr lang="es-AR"/>
+                    </a:p>
+                  </a:txBody>
+                  <a:tcPr/>
+                </a:tc>
+                <a:tc hMerge="1">
+                  <a:txBody>
+                    <a:bodyPr/>
+                    <a:lstStyle/>
+                    <a:p>
+                      <a:endParaRPr lang="es-AR"/>
+                    </a:p>
+                  </a:txBody>
+                  <a:tcPr/>
+                </a:tc>
+                <a:tc hMerge="1">
+                  <a:txBody>
+                    <a:bodyPr/>
+                    <a:lstStyle/>
+                    <a:p>
+                      <a:endParaRPr lang="es-AR"/>
+                    </a:p>
+                  </a:txBody>
+                  <a:tcPr/>
+                </a:tc>
+              </a:tr>
+              <a:tr h="100249">
+                <a:tc>
+                  <a:txBody>
+                    <a:bodyPr/>
+                    <a:lstStyle/>
+                    <a:p>
+                      <a:pPr algn="l" fontAlgn="b"/>
+                      <a:r>
+                        <a:rPr lang="es-AR" sz="1400" u="none" strike="noStrike">
+                          <a:effectLst/>
+                        </a:rPr>
+                        <a:t>Concepto</a:t>
+                      </a:r>
+                      <a:endParaRPr lang="es-AR" sz="1400" b="1" i="0" u="none" strike="noStrike">
+                        <a:solidFill>
+                          <a:srgbClr val="FFFFFF"/>
+                        </a:solidFill>
+                        <a:effectLst/>
+                        <a:latin typeface="Arial"/>
+                      </a:endParaRPr>
+                    </a:p>
+                  </a:txBody>
+                  <a:tcPr marL="5806" marR="5806" marT="5806" marB="0" anchor="b"/>
+                </a:tc>
+                <a:tc>
+                  <a:txBody>
+                    <a:bodyPr/>
+                    <a:lstStyle/>
+                    <a:p>
+                      <a:pPr algn="ctr" fontAlgn="b"/>
+                      <a:r>
+                        <a:rPr lang="es-AR" sz="1400" u="none" strike="noStrike">
+                          <a:effectLst/>
+                        </a:rPr>
+                        <a:t>Neto</a:t>
+                      </a:r>
+                      <a:endParaRPr lang="es-AR" sz="1400" b="1" i="0" u="none" strike="noStrike">
+                        <a:solidFill>
+                          <a:srgbClr val="FFFFFF"/>
+                        </a:solidFill>
+                        <a:effectLst/>
+                        <a:latin typeface="Arial"/>
+                      </a:endParaRPr>
+                    </a:p>
+                  </a:txBody>
+                  <a:tcPr marL="5806" marR="5806" marT="5806" marB="0" anchor="b"/>
+                </a:tc>
+                <a:tc>
+                  <a:txBody>
+                    <a:bodyPr/>
+                    <a:lstStyle/>
+                    <a:p>
+                      <a:pPr algn="ctr" fontAlgn="b"/>
+                      <a:r>
+                        <a:rPr lang="es-AR" sz="1400" u="none" strike="noStrike">
+                          <a:effectLst/>
+                        </a:rPr>
+                        <a:t>Unitario Total</a:t>
+                      </a:r>
+                      <a:endParaRPr lang="es-AR" sz="1400" b="1" i="0" u="none" strike="noStrike">
+                        <a:solidFill>
+                          <a:srgbClr val="FFFFFF"/>
+                        </a:solidFill>
+                        <a:effectLst/>
+                        <a:latin typeface="Arial"/>
+                      </a:endParaRPr>
+                    </a:p>
+                  </a:txBody>
+                  <a:tcPr marL="5806" marR="5806" marT="5806" marB="0" anchor="b"/>
+                </a:tc>
+                <a:tc>
+                  <a:txBody>
+                    <a:bodyPr/>
+                    <a:lstStyle/>
+                    <a:p>
+                      <a:pPr algn="ctr" fontAlgn="b"/>
+                      <a:r>
+                        <a:rPr lang="es-AR" sz="1400" u="none" strike="noStrike">
+                          <a:effectLst/>
+                        </a:rPr>
+                        <a:t> </a:t>
+                      </a:r>
+                      <a:endParaRPr lang="es-AR" sz="1400" b="1" i="0" u="none" strike="noStrike">
+                        <a:solidFill>
+                          <a:srgbClr val="FFFFFF"/>
+                        </a:solidFill>
+                        <a:effectLst/>
+                        <a:latin typeface="Arial"/>
+                      </a:endParaRPr>
+                    </a:p>
+                  </a:txBody>
+                  <a:tcPr marL="5806" marR="5806" marT="5806" marB="0" anchor="b"/>
+                </a:tc>
+                <a:tc>
+                  <a:txBody>
+                    <a:bodyPr/>
+                    <a:lstStyle/>
+                    <a:p>
+                      <a:pPr algn="ctr" fontAlgn="b"/>
+                      <a:r>
+                        <a:rPr lang="es-AR" sz="1400" u="none" strike="noStrike">
+                          <a:effectLst/>
+                        </a:rPr>
+                        <a:t>1</a:t>
+                      </a:r>
+                      <a:endParaRPr lang="es-AR" sz="1400" b="1" i="0" u="none" strike="noStrike">
+                        <a:solidFill>
+                          <a:srgbClr val="FFFFFF"/>
+                        </a:solidFill>
+                        <a:effectLst/>
+                        <a:latin typeface="Arial"/>
+                      </a:endParaRPr>
+                    </a:p>
+                  </a:txBody>
+                  <a:tcPr marL="5806" marR="5806" marT="5806" marB="0" anchor="b"/>
+                </a:tc>
+                <a:tc>
+                  <a:txBody>
+                    <a:bodyPr/>
+                    <a:lstStyle/>
+                    <a:p>
+                      <a:pPr algn="ctr" fontAlgn="b"/>
+                      <a:r>
+                        <a:rPr lang="es-AR" sz="1400" u="none" strike="noStrike">
+                          <a:effectLst/>
+                        </a:rPr>
+                        <a:t>2</a:t>
+                      </a:r>
+                      <a:endParaRPr lang="es-AR" sz="1400" b="1" i="0" u="none" strike="noStrike">
+                        <a:solidFill>
+                          <a:srgbClr val="FFFFFF"/>
+                        </a:solidFill>
+                        <a:effectLst/>
+                        <a:latin typeface="Arial"/>
+                      </a:endParaRPr>
+                    </a:p>
+                  </a:txBody>
+                  <a:tcPr marL="5806" marR="5806" marT="5806" marB="0" anchor="b"/>
+                </a:tc>
+                <a:tc>
+                  <a:txBody>
+                    <a:bodyPr/>
+                    <a:lstStyle/>
+                    <a:p>
+                      <a:pPr algn="ctr" fontAlgn="b"/>
+                      <a:r>
+                        <a:rPr lang="es-AR" sz="1400" u="none" strike="noStrike">
+                          <a:effectLst/>
+                        </a:rPr>
+                        <a:t>3</a:t>
+                      </a:r>
+                      <a:endParaRPr lang="es-AR" sz="1400" b="1" i="0" u="none" strike="noStrike">
+                        <a:solidFill>
+                          <a:srgbClr val="FFFFFF"/>
+                        </a:solidFill>
+                        <a:effectLst/>
+                        <a:latin typeface="Arial"/>
+                      </a:endParaRPr>
+                    </a:p>
+                  </a:txBody>
+                  <a:tcPr marL="5806" marR="5806" marT="5806" marB="0" anchor="b"/>
+                </a:tc>
+                <a:tc>
+                  <a:txBody>
+                    <a:bodyPr/>
+                    <a:lstStyle/>
+                    <a:p>
+                      <a:pPr algn="ctr" fontAlgn="b"/>
+                      <a:r>
+                        <a:rPr lang="es-AR" sz="1400" u="none" strike="noStrike">
+                          <a:effectLst/>
+                        </a:rPr>
+                        <a:t>4</a:t>
+                      </a:r>
+                      <a:endParaRPr lang="es-AR" sz="1400" b="1" i="0" u="none" strike="noStrike">
+                        <a:solidFill>
+                          <a:srgbClr val="FFFFFF"/>
+                        </a:solidFill>
+                        <a:effectLst/>
+                        <a:latin typeface="Arial"/>
+                      </a:endParaRPr>
+                    </a:p>
+                  </a:txBody>
+                  <a:tcPr marL="5806" marR="5806" marT="5806" marB="0" anchor="b"/>
+                </a:tc>
+                <a:tc>
+                  <a:txBody>
+                    <a:bodyPr/>
+                    <a:lstStyle/>
+                    <a:p>
+                      <a:pPr algn="ctr" fontAlgn="b"/>
+                      <a:r>
+                        <a:rPr lang="es-AR" sz="1400" u="none" strike="noStrike">
+                          <a:effectLst/>
+                        </a:rPr>
+                        <a:t>5</a:t>
+                      </a:r>
+                      <a:endParaRPr lang="es-AR" sz="1400" b="1" i="0" u="none" strike="noStrike">
+                        <a:solidFill>
+                          <a:srgbClr val="FFFFFF"/>
+                        </a:solidFill>
+                        <a:effectLst/>
+                        <a:latin typeface="Arial"/>
+                      </a:endParaRPr>
+                    </a:p>
+                  </a:txBody>
+                  <a:tcPr marL="5806" marR="5806" marT="5806" marB="0" anchor="b"/>
+                </a:tc>
+                <a:tc>
+                  <a:txBody>
+                    <a:bodyPr/>
+                    <a:lstStyle/>
+                    <a:p>
+                      <a:pPr algn="ctr" fontAlgn="b"/>
+                      <a:r>
+                        <a:rPr lang="es-AR" sz="1400" u="none" strike="noStrike">
+                          <a:effectLst/>
+                        </a:rPr>
+                        <a:t>6</a:t>
+                      </a:r>
+                      <a:endParaRPr lang="es-AR" sz="1400" b="1" i="0" u="none" strike="noStrike">
+                        <a:solidFill>
+                          <a:srgbClr val="FFFFFF"/>
+                        </a:solidFill>
+                        <a:effectLst/>
+                        <a:latin typeface="Arial"/>
+                      </a:endParaRPr>
+                    </a:p>
+                  </a:txBody>
+                  <a:tcPr marL="5806" marR="5806" marT="5806" marB="0" anchor="b"/>
+                </a:tc>
+              </a:tr>
+              <a:tr h="98700">
+                <a:tc>
+                  <a:txBody>
+                    <a:bodyPr/>
+                    <a:lstStyle/>
+                    <a:p>
+                      <a:pPr algn="l" fontAlgn="b"/>
+                      <a:r>
+                        <a:rPr lang="es-AR" sz="1400" u="none" strike="noStrike">
+                          <a:effectLst/>
+                        </a:rPr>
+                        <a:t>Arquitecto / Lider</a:t>
+                      </a:r>
+                      <a:endParaRPr lang="es-AR" sz="1400" b="0" i="0" u="none" strike="noStrike">
+                        <a:effectLst/>
+                        <a:latin typeface="Arial"/>
+                      </a:endParaRPr>
+                    </a:p>
+                  </a:txBody>
+                  <a:tcPr marL="5806" marR="5806" marT="5806" marB="0" anchor="b"/>
+                </a:tc>
+                <a:tc>
+                  <a:txBody>
+                    <a:bodyPr/>
+                    <a:lstStyle/>
+                    <a:p>
+                      <a:pPr algn="r" fontAlgn="b"/>
+                      <a:r>
+                        <a:rPr lang="es-AR" sz="1400" u="none" strike="noStrike">
+                          <a:effectLst/>
+                        </a:rPr>
+                        <a:t>$ 8.000</a:t>
+                      </a:r>
+                      <a:endParaRPr lang="es-AR" sz="1400" b="0" i="0" u="none" strike="noStrike">
+                        <a:effectLst/>
+                        <a:latin typeface="Arial"/>
+                      </a:endParaRPr>
+                    </a:p>
+                  </a:txBody>
+                  <a:tcPr marL="5806" marR="5806" marT="5806" marB="0" anchor="b"/>
+                </a:tc>
+                <a:tc>
+                  <a:txBody>
+                    <a:bodyPr/>
+                    <a:lstStyle/>
+                    <a:p>
+                      <a:pPr algn="r" fontAlgn="b"/>
+                      <a:r>
+                        <a:rPr lang="es-AR" sz="1400" u="none" strike="noStrike">
+                          <a:effectLst/>
+                        </a:rPr>
+                        <a:t>$ 16.626</a:t>
+                      </a:r>
+                      <a:endParaRPr lang="es-AR" sz="1400" b="0" i="0" u="none" strike="noStrike">
+                        <a:effectLst/>
+                        <a:latin typeface="Arial"/>
+                      </a:endParaRPr>
+                    </a:p>
+                  </a:txBody>
+                  <a:tcPr marL="5806" marR="5806" marT="5806" marB="0" anchor="b"/>
+                </a:tc>
+                <a:tc>
+                  <a:txBody>
+                    <a:bodyPr/>
+                    <a:lstStyle/>
+                    <a:p>
+                      <a:pPr algn="ctr" fontAlgn="b"/>
+                      <a:r>
+                        <a:rPr lang="es-AR" sz="1400" u="none" strike="noStrike">
+                          <a:effectLst/>
+                        </a:rPr>
+                        <a:t>1</a:t>
+                      </a:r>
+                      <a:endParaRPr lang="es-AR" sz="1400" b="0" i="0" u="none" strike="noStrike">
+                        <a:effectLst/>
+                        <a:latin typeface="Arial"/>
+                      </a:endParaRPr>
+                    </a:p>
+                  </a:txBody>
+                  <a:tcPr marL="5806" marR="5806" marT="5806" marB="0" anchor="b"/>
+                </a:tc>
+                <a:tc>
+                  <a:txBody>
+                    <a:bodyPr/>
+                    <a:lstStyle/>
+                    <a:p>
+                      <a:pPr algn="ctr" fontAlgn="b"/>
+                      <a:r>
+                        <a:rPr lang="es-AR" sz="1400" u="none" strike="noStrike">
+                          <a:effectLst/>
+                        </a:rPr>
+                        <a:t>1</a:t>
+                      </a:r>
+                      <a:endParaRPr lang="es-AR" sz="1400" b="0" i="0" u="none" strike="noStrike">
+                        <a:effectLst/>
+                        <a:latin typeface="Arial"/>
+                      </a:endParaRPr>
+                    </a:p>
+                  </a:txBody>
+                  <a:tcPr marL="5806" marR="5806" marT="5806" marB="0" anchor="b"/>
+                </a:tc>
+                <a:tc>
+                  <a:txBody>
+                    <a:bodyPr/>
+                    <a:lstStyle/>
+                    <a:p>
+                      <a:pPr algn="ctr" fontAlgn="b"/>
+                      <a:r>
+                        <a:rPr lang="es-AR" sz="1400" u="none" strike="noStrike">
+                          <a:effectLst/>
+                        </a:rPr>
+                        <a:t>1</a:t>
+                      </a:r>
+                      <a:endParaRPr lang="es-AR" sz="1400" b="0" i="0" u="none" strike="noStrike">
+                        <a:effectLst/>
+                        <a:latin typeface="Arial"/>
+                      </a:endParaRPr>
+                    </a:p>
+                  </a:txBody>
+                  <a:tcPr marL="5806" marR="5806" marT="5806" marB="0" anchor="b"/>
+                </a:tc>
+                <a:tc>
+                  <a:txBody>
+                    <a:bodyPr/>
+                    <a:lstStyle/>
+                    <a:p>
+                      <a:pPr algn="ctr" fontAlgn="b"/>
+                      <a:r>
+                        <a:rPr lang="es-AR" sz="1400" u="none" strike="noStrike">
+                          <a:effectLst/>
+                        </a:rPr>
+                        <a:t>1</a:t>
+                      </a:r>
+                      <a:endParaRPr lang="es-AR" sz="1400" b="0" i="0" u="none" strike="noStrike">
+                        <a:effectLst/>
+                        <a:latin typeface="Arial"/>
+                      </a:endParaRPr>
+                    </a:p>
+                  </a:txBody>
+                  <a:tcPr marL="5806" marR="5806" marT="5806" marB="0" anchor="b"/>
+                </a:tc>
+                <a:tc>
+                  <a:txBody>
+                    <a:bodyPr/>
+                    <a:lstStyle/>
+                    <a:p>
+                      <a:pPr algn="ctr" fontAlgn="b"/>
+                      <a:r>
+                        <a:rPr lang="es-AR" sz="1400" u="none" strike="noStrike">
+                          <a:effectLst/>
+                        </a:rPr>
+                        <a:t>1</a:t>
+                      </a:r>
+                      <a:endParaRPr lang="es-AR" sz="1400" b="0" i="0" u="none" strike="noStrike">
+                        <a:effectLst/>
+                        <a:latin typeface="Arial"/>
+                      </a:endParaRPr>
+                    </a:p>
+                  </a:txBody>
+                  <a:tcPr marL="5806" marR="5806" marT="5806" marB="0" anchor="b"/>
+                </a:tc>
+                <a:tc>
+                  <a:txBody>
+                    <a:bodyPr/>
+                    <a:lstStyle/>
+                    <a:p>
+                      <a:pPr algn="ctr" fontAlgn="b"/>
+                      <a:r>
+                        <a:rPr lang="es-AR" sz="1400" u="none" strike="noStrike">
+                          <a:effectLst/>
+                        </a:rPr>
+                        <a:t>1</a:t>
+                      </a:r>
+                      <a:endParaRPr lang="es-AR" sz="1400" b="0" i="0" u="none" strike="noStrike">
+                        <a:effectLst/>
+                        <a:latin typeface="Arial"/>
+                      </a:endParaRPr>
+                    </a:p>
+                  </a:txBody>
+                  <a:tcPr marL="5806" marR="5806" marT="5806" marB="0" anchor="b"/>
+                </a:tc>
+                <a:tc>
+                  <a:txBody>
+                    <a:bodyPr/>
+                    <a:lstStyle/>
+                    <a:p>
+                      <a:pPr algn="ctr" fontAlgn="b"/>
+                      <a:r>
+                        <a:rPr lang="es-AR" sz="1400" u="none" strike="noStrike" dirty="0">
+                          <a:effectLst/>
+                        </a:rPr>
+                        <a:t>1</a:t>
+                      </a:r>
+                      <a:endParaRPr lang="es-AR" sz="1400" b="0" i="0" u="none" strike="noStrike" dirty="0">
+                        <a:effectLst/>
+                        <a:latin typeface="Arial"/>
+                      </a:endParaRPr>
+                    </a:p>
+                  </a:txBody>
+                  <a:tcPr marL="5806" marR="5806" marT="5806" marB="0" anchor="b"/>
+                </a:tc>
+              </a:tr>
+              <a:tr h="98700">
+                <a:tc>
+                  <a:txBody>
+                    <a:bodyPr/>
+                    <a:lstStyle/>
+                    <a:p>
+                      <a:pPr algn="l" fontAlgn="b"/>
+                      <a:r>
+                        <a:rPr lang="es-AR" sz="1400" u="none" strike="noStrike">
+                          <a:effectLst/>
+                        </a:rPr>
+                        <a:t>IT</a:t>
+                      </a:r>
+                      <a:endParaRPr lang="es-AR" sz="1400" b="0" i="0" u="none" strike="noStrike">
+                        <a:effectLst/>
+                        <a:latin typeface="Arial"/>
+                      </a:endParaRPr>
+                    </a:p>
+                  </a:txBody>
+                  <a:tcPr marL="5806" marR="5806" marT="5806" marB="0" anchor="b"/>
+                </a:tc>
+                <a:tc>
+                  <a:txBody>
+                    <a:bodyPr/>
+                    <a:lstStyle/>
+                    <a:p>
+                      <a:pPr algn="r" fontAlgn="b"/>
+                      <a:r>
+                        <a:rPr lang="es-AR" sz="1400" u="none" strike="noStrike">
+                          <a:effectLst/>
+                        </a:rPr>
+                        <a:t>$ 4.000</a:t>
+                      </a:r>
+                      <a:endParaRPr lang="es-AR" sz="1400" b="0" i="0" u="none" strike="noStrike">
+                        <a:effectLst/>
+                        <a:latin typeface="Arial"/>
+                      </a:endParaRPr>
+                    </a:p>
+                  </a:txBody>
+                  <a:tcPr marL="5806" marR="5806" marT="5806" marB="0" anchor="b"/>
+                </a:tc>
+                <a:tc>
+                  <a:txBody>
+                    <a:bodyPr/>
+                    <a:lstStyle/>
+                    <a:p>
+                      <a:pPr algn="r" fontAlgn="b"/>
+                      <a:r>
+                        <a:rPr lang="es-AR" sz="1400" u="none" strike="noStrike">
+                          <a:effectLst/>
+                        </a:rPr>
+                        <a:t>$ 8.313</a:t>
+                      </a:r>
+                      <a:endParaRPr lang="es-AR" sz="1400" b="0" i="0" u="none" strike="noStrike">
+                        <a:effectLst/>
+                        <a:latin typeface="Arial"/>
+                      </a:endParaRPr>
+                    </a:p>
+                  </a:txBody>
+                  <a:tcPr marL="5806" marR="5806" marT="5806" marB="0" anchor="b"/>
+                </a:tc>
+                <a:tc>
+                  <a:txBody>
+                    <a:bodyPr/>
+                    <a:lstStyle/>
+                    <a:p>
+                      <a:pPr algn="ctr" fontAlgn="b"/>
+                      <a:r>
+                        <a:rPr lang="es-AR" sz="1400" u="none" strike="noStrike">
+                          <a:effectLst/>
+                        </a:rPr>
+                        <a:t>1</a:t>
+                      </a:r>
+                      <a:endParaRPr lang="es-AR" sz="1400" b="0" i="0" u="none" strike="noStrike">
+                        <a:effectLst/>
+                        <a:latin typeface="Arial"/>
+                      </a:endParaRPr>
+                    </a:p>
+                  </a:txBody>
+                  <a:tcPr marL="5806" marR="5806" marT="5806" marB="0" anchor="b"/>
+                </a:tc>
+                <a:tc>
+                  <a:txBody>
+                    <a:bodyPr/>
+                    <a:lstStyle/>
+                    <a:p>
+                      <a:pPr algn="ctr" fontAlgn="b"/>
+                      <a:r>
+                        <a:rPr lang="es-AR" sz="1400" u="none" strike="noStrike">
+                          <a:effectLst/>
+                        </a:rPr>
+                        <a:t>1</a:t>
+                      </a:r>
+                      <a:endParaRPr lang="es-AR" sz="1400" b="0" i="0" u="none" strike="noStrike">
+                        <a:effectLst/>
+                        <a:latin typeface="Arial"/>
+                      </a:endParaRPr>
+                    </a:p>
+                  </a:txBody>
+                  <a:tcPr marL="5806" marR="5806" marT="5806" marB="0" anchor="b"/>
+                </a:tc>
+                <a:tc>
+                  <a:txBody>
+                    <a:bodyPr/>
+                    <a:lstStyle/>
+                    <a:p>
+                      <a:pPr algn="ctr" fontAlgn="b"/>
+                      <a:r>
+                        <a:rPr lang="es-AR" sz="1400" u="none" strike="noStrike">
+                          <a:effectLst/>
+                        </a:rPr>
+                        <a:t>1</a:t>
+                      </a:r>
+                      <a:endParaRPr lang="es-AR" sz="1400" b="0" i="0" u="none" strike="noStrike">
+                        <a:effectLst/>
+                        <a:latin typeface="Arial"/>
+                      </a:endParaRPr>
+                    </a:p>
+                  </a:txBody>
+                  <a:tcPr marL="5806" marR="5806" marT="5806" marB="0" anchor="b"/>
+                </a:tc>
+                <a:tc>
+                  <a:txBody>
+                    <a:bodyPr/>
+                    <a:lstStyle/>
+                    <a:p>
+                      <a:pPr algn="ctr" fontAlgn="b"/>
+                      <a:r>
+                        <a:rPr lang="es-AR" sz="1400" u="none" strike="noStrike">
+                          <a:effectLst/>
+                        </a:rPr>
+                        <a:t>1</a:t>
+                      </a:r>
+                      <a:endParaRPr lang="es-AR" sz="1400" b="0" i="0" u="none" strike="noStrike">
+                        <a:effectLst/>
+                        <a:latin typeface="Arial"/>
+                      </a:endParaRPr>
+                    </a:p>
+                  </a:txBody>
+                  <a:tcPr marL="5806" marR="5806" marT="5806" marB="0" anchor="b"/>
+                </a:tc>
+                <a:tc>
+                  <a:txBody>
+                    <a:bodyPr/>
+                    <a:lstStyle/>
+                    <a:p>
+                      <a:pPr algn="ctr" fontAlgn="b"/>
+                      <a:r>
+                        <a:rPr lang="es-AR" sz="1400" u="none" strike="noStrike">
+                          <a:effectLst/>
+                        </a:rPr>
+                        <a:t>1</a:t>
+                      </a:r>
+                      <a:endParaRPr lang="es-AR" sz="1400" b="0" i="0" u="none" strike="noStrike">
+                        <a:effectLst/>
+                        <a:latin typeface="Arial"/>
+                      </a:endParaRPr>
+                    </a:p>
+                  </a:txBody>
+                  <a:tcPr marL="5806" marR="5806" marT="5806" marB="0" anchor="b"/>
+                </a:tc>
+                <a:tc>
+                  <a:txBody>
+                    <a:bodyPr/>
+                    <a:lstStyle/>
+                    <a:p>
+                      <a:pPr algn="ctr" fontAlgn="b"/>
+                      <a:r>
+                        <a:rPr lang="es-AR" sz="1400" u="none" strike="noStrike" dirty="0">
+                          <a:effectLst/>
+                        </a:rPr>
+                        <a:t>1</a:t>
+                      </a:r>
+                      <a:endParaRPr lang="es-AR" sz="1400" b="0" i="0" u="none" strike="noStrike" dirty="0">
+                        <a:effectLst/>
+                        <a:latin typeface="Arial"/>
+                      </a:endParaRPr>
+                    </a:p>
+                  </a:txBody>
+                  <a:tcPr marL="5806" marR="5806" marT="5806" marB="0" anchor="b"/>
+                </a:tc>
+                <a:tc>
+                  <a:txBody>
+                    <a:bodyPr/>
+                    <a:lstStyle/>
+                    <a:p>
+                      <a:pPr algn="ctr" fontAlgn="b"/>
+                      <a:r>
+                        <a:rPr lang="es-AR" sz="1400" u="none" strike="noStrike">
+                          <a:effectLst/>
+                        </a:rPr>
+                        <a:t>1</a:t>
+                      </a:r>
+                      <a:endParaRPr lang="es-AR" sz="1400" b="0" i="0" u="none" strike="noStrike">
+                        <a:effectLst/>
+                        <a:latin typeface="Arial"/>
+                      </a:endParaRPr>
+                    </a:p>
+                  </a:txBody>
+                  <a:tcPr marL="5806" marR="5806" marT="5806" marB="0" anchor="b"/>
+                </a:tc>
+              </a:tr>
+              <a:tr h="98700">
+                <a:tc>
+                  <a:txBody>
+                    <a:bodyPr/>
+                    <a:lstStyle/>
+                    <a:p>
+                      <a:pPr algn="l" fontAlgn="b"/>
+                      <a:r>
+                        <a:rPr lang="es-AR" sz="1400" u="none" strike="noStrike">
+                          <a:effectLst/>
+                        </a:rPr>
+                        <a:t>Programador Senior</a:t>
+                      </a:r>
+                      <a:endParaRPr lang="es-AR" sz="1400" b="0" i="0" u="none" strike="noStrike">
+                        <a:effectLst/>
+                        <a:latin typeface="Arial"/>
+                      </a:endParaRPr>
+                    </a:p>
+                  </a:txBody>
+                  <a:tcPr marL="5806" marR="5806" marT="5806" marB="0" anchor="b"/>
+                </a:tc>
+                <a:tc>
+                  <a:txBody>
+                    <a:bodyPr/>
+                    <a:lstStyle/>
+                    <a:p>
+                      <a:pPr algn="r" fontAlgn="b"/>
+                      <a:r>
+                        <a:rPr lang="es-AR" sz="1400" u="none" strike="noStrike">
+                          <a:effectLst/>
+                        </a:rPr>
+                        <a:t>$ 5.500</a:t>
+                      </a:r>
+                      <a:endParaRPr lang="es-AR" sz="1400" b="0" i="0" u="none" strike="noStrike">
+                        <a:effectLst/>
+                        <a:latin typeface="Arial"/>
+                      </a:endParaRPr>
+                    </a:p>
+                  </a:txBody>
+                  <a:tcPr marL="5806" marR="5806" marT="5806" marB="0" anchor="b"/>
+                </a:tc>
+                <a:tc>
+                  <a:txBody>
+                    <a:bodyPr/>
+                    <a:lstStyle/>
+                    <a:p>
+                      <a:pPr algn="r" fontAlgn="b"/>
+                      <a:r>
+                        <a:rPr lang="es-AR" sz="1400" u="none" strike="noStrike">
+                          <a:effectLst/>
+                        </a:rPr>
+                        <a:t>$ 11.430</a:t>
+                      </a:r>
+                      <a:endParaRPr lang="es-AR" sz="1400" b="0" i="0" u="none" strike="noStrike">
+                        <a:effectLst/>
+                        <a:latin typeface="Arial"/>
+                      </a:endParaRPr>
+                    </a:p>
+                  </a:txBody>
+                  <a:tcPr marL="5806" marR="5806" marT="5806" marB="0" anchor="b"/>
+                </a:tc>
+                <a:tc>
+                  <a:txBody>
+                    <a:bodyPr/>
+                    <a:lstStyle/>
+                    <a:p>
+                      <a:pPr algn="ctr" fontAlgn="b"/>
+                      <a:r>
+                        <a:rPr lang="es-AR" sz="1400" u="none" strike="noStrike">
+                          <a:effectLst/>
+                        </a:rPr>
+                        <a:t>2</a:t>
+                      </a:r>
+                      <a:endParaRPr lang="es-AR" sz="1400" b="0" i="0" u="none" strike="noStrike">
+                        <a:effectLst/>
+                        <a:latin typeface="Arial"/>
+                      </a:endParaRPr>
+                    </a:p>
+                  </a:txBody>
+                  <a:tcPr marL="5806" marR="5806" marT="5806" marB="0" anchor="b"/>
+                </a:tc>
+                <a:tc>
+                  <a:txBody>
+                    <a:bodyPr/>
+                    <a:lstStyle/>
+                    <a:p>
+                      <a:pPr algn="ctr" fontAlgn="b"/>
+                      <a:r>
+                        <a:rPr lang="es-AR" sz="1400" u="none" strike="noStrike">
+                          <a:effectLst/>
+                        </a:rPr>
+                        <a:t>0</a:t>
+                      </a:r>
+                      <a:endParaRPr lang="es-AR" sz="1400" b="0" i="0" u="none" strike="noStrike">
+                        <a:effectLst/>
+                        <a:latin typeface="Arial"/>
+                      </a:endParaRPr>
+                    </a:p>
+                  </a:txBody>
+                  <a:tcPr marL="5806" marR="5806" marT="5806" marB="0" anchor="b"/>
+                </a:tc>
+                <a:tc>
+                  <a:txBody>
+                    <a:bodyPr/>
+                    <a:lstStyle/>
+                    <a:p>
+                      <a:pPr algn="ctr" fontAlgn="b"/>
+                      <a:r>
+                        <a:rPr lang="es-AR" sz="1400" u="none" strike="noStrike">
+                          <a:effectLst/>
+                        </a:rPr>
+                        <a:t>2</a:t>
+                      </a:r>
+                      <a:endParaRPr lang="es-AR" sz="1400" b="0" i="0" u="none" strike="noStrike">
+                        <a:effectLst/>
+                        <a:latin typeface="Arial"/>
+                      </a:endParaRPr>
+                    </a:p>
+                  </a:txBody>
+                  <a:tcPr marL="5806" marR="5806" marT="5806" marB="0" anchor="b"/>
+                </a:tc>
+                <a:tc>
+                  <a:txBody>
+                    <a:bodyPr/>
+                    <a:lstStyle/>
+                    <a:p>
+                      <a:pPr algn="ctr" fontAlgn="b"/>
+                      <a:r>
+                        <a:rPr lang="es-AR" sz="1400" u="none" strike="noStrike">
+                          <a:effectLst/>
+                        </a:rPr>
+                        <a:t>2</a:t>
+                      </a:r>
+                      <a:endParaRPr lang="es-AR" sz="1400" b="0" i="0" u="none" strike="noStrike">
+                        <a:effectLst/>
+                        <a:latin typeface="Arial"/>
+                      </a:endParaRPr>
+                    </a:p>
+                  </a:txBody>
+                  <a:tcPr marL="5806" marR="5806" marT="5806" marB="0" anchor="b"/>
+                </a:tc>
+                <a:tc>
+                  <a:txBody>
+                    <a:bodyPr/>
+                    <a:lstStyle/>
+                    <a:p>
+                      <a:pPr algn="ctr" fontAlgn="b"/>
+                      <a:r>
+                        <a:rPr lang="es-AR" sz="1400" u="none" strike="noStrike">
+                          <a:effectLst/>
+                        </a:rPr>
+                        <a:t>2</a:t>
+                      </a:r>
+                      <a:endParaRPr lang="es-AR" sz="1400" b="0" i="0" u="none" strike="noStrike">
+                        <a:effectLst/>
+                        <a:latin typeface="Arial"/>
+                      </a:endParaRPr>
+                    </a:p>
+                  </a:txBody>
+                  <a:tcPr marL="5806" marR="5806" marT="5806" marB="0" anchor="b"/>
+                </a:tc>
+                <a:tc>
+                  <a:txBody>
+                    <a:bodyPr/>
+                    <a:lstStyle/>
+                    <a:p>
+                      <a:pPr algn="ctr" fontAlgn="b"/>
+                      <a:r>
+                        <a:rPr lang="es-AR" sz="1400" u="none" strike="noStrike">
+                          <a:effectLst/>
+                        </a:rPr>
+                        <a:t>2</a:t>
+                      </a:r>
+                      <a:endParaRPr lang="es-AR" sz="1400" b="0" i="0" u="none" strike="noStrike">
+                        <a:effectLst/>
+                        <a:latin typeface="Arial"/>
+                      </a:endParaRPr>
+                    </a:p>
+                  </a:txBody>
+                  <a:tcPr marL="5806" marR="5806" marT="5806" marB="0" anchor="b"/>
+                </a:tc>
+                <a:tc>
+                  <a:txBody>
+                    <a:bodyPr/>
+                    <a:lstStyle/>
+                    <a:p>
+                      <a:pPr algn="ctr" fontAlgn="b"/>
+                      <a:r>
+                        <a:rPr lang="es-AR" sz="1400" u="none" strike="noStrike">
+                          <a:effectLst/>
+                        </a:rPr>
+                        <a:t>2</a:t>
+                      </a:r>
+                      <a:endParaRPr lang="es-AR" sz="1400" b="0" i="0" u="none" strike="noStrike">
+                        <a:effectLst/>
+                        <a:latin typeface="Arial"/>
+                      </a:endParaRPr>
+                    </a:p>
+                  </a:txBody>
+                  <a:tcPr marL="5806" marR="5806" marT="5806" marB="0" anchor="b"/>
+                </a:tc>
+              </a:tr>
+              <a:tr h="98700">
+                <a:tc>
+                  <a:txBody>
+                    <a:bodyPr/>
+                    <a:lstStyle/>
+                    <a:p>
+                      <a:pPr algn="l" fontAlgn="b"/>
+                      <a:r>
+                        <a:rPr lang="es-AR" sz="1400" u="none" strike="noStrike">
+                          <a:effectLst/>
+                        </a:rPr>
+                        <a:t>Programador SemiSenior</a:t>
+                      </a:r>
+                      <a:endParaRPr lang="es-AR" sz="1400" b="0" i="0" u="none" strike="noStrike">
+                        <a:effectLst/>
+                        <a:latin typeface="Arial"/>
+                      </a:endParaRPr>
+                    </a:p>
+                  </a:txBody>
+                  <a:tcPr marL="5806" marR="5806" marT="5806" marB="0" anchor="b"/>
+                </a:tc>
+                <a:tc>
+                  <a:txBody>
+                    <a:bodyPr/>
+                    <a:lstStyle/>
+                    <a:p>
+                      <a:pPr algn="r" fontAlgn="b"/>
+                      <a:r>
+                        <a:rPr lang="es-AR" sz="1400" u="none" strike="noStrike">
+                          <a:effectLst/>
+                        </a:rPr>
+                        <a:t>$ 4.000</a:t>
+                      </a:r>
+                      <a:endParaRPr lang="es-AR" sz="1400" b="0" i="0" u="none" strike="noStrike">
+                        <a:effectLst/>
+                        <a:latin typeface="Arial"/>
+                      </a:endParaRPr>
+                    </a:p>
+                  </a:txBody>
+                  <a:tcPr marL="5806" marR="5806" marT="5806" marB="0" anchor="b"/>
+                </a:tc>
+                <a:tc>
+                  <a:txBody>
+                    <a:bodyPr/>
+                    <a:lstStyle/>
+                    <a:p>
+                      <a:pPr algn="r" fontAlgn="b"/>
+                      <a:r>
+                        <a:rPr lang="es-AR" sz="1400" u="none" strike="noStrike">
+                          <a:effectLst/>
+                        </a:rPr>
+                        <a:t>$ 8.313</a:t>
+                      </a:r>
+                      <a:endParaRPr lang="es-AR" sz="1400" b="0" i="0" u="none" strike="noStrike">
+                        <a:effectLst/>
+                        <a:latin typeface="Arial"/>
+                      </a:endParaRPr>
+                    </a:p>
+                  </a:txBody>
+                  <a:tcPr marL="5806" marR="5806" marT="5806" marB="0" anchor="b"/>
+                </a:tc>
+                <a:tc>
+                  <a:txBody>
+                    <a:bodyPr/>
+                    <a:lstStyle/>
+                    <a:p>
+                      <a:pPr algn="ctr" fontAlgn="b"/>
+                      <a:r>
+                        <a:rPr lang="es-AR" sz="1400" u="none" strike="noStrike">
+                          <a:effectLst/>
+                        </a:rPr>
+                        <a:t>1</a:t>
+                      </a:r>
+                      <a:endParaRPr lang="es-AR" sz="1400" b="0" i="0" u="none" strike="noStrike">
+                        <a:effectLst/>
+                        <a:latin typeface="Arial"/>
+                      </a:endParaRPr>
+                    </a:p>
+                  </a:txBody>
+                  <a:tcPr marL="5806" marR="5806" marT="5806" marB="0" anchor="b"/>
+                </a:tc>
+                <a:tc>
+                  <a:txBody>
+                    <a:bodyPr/>
+                    <a:lstStyle/>
+                    <a:p>
+                      <a:pPr algn="ctr" fontAlgn="b"/>
+                      <a:r>
+                        <a:rPr lang="es-AR" sz="1400" u="none" strike="noStrike">
+                          <a:effectLst/>
+                        </a:rPr>
+                        <a:t>0</a:t>
+                      </a:r>
+                      <a:endParaRPr lang="es-AR" sz="1400" b="0" i="0" u="none" strike="noStrike">
+                        <a:effectLst/>
+                        <a:latin typeface="Arial"/>
+                      </a:endParaRPr>
+                    </a:p>
+                  </a:txBody>
+                  <a:tcPr marL="5806" marR="5806" marT="5806" marB="0" anchor="b"/>
+                </a:tc>
+                <a:tc>
+                  <a:txBody>
+                    <a:bodyPr/>
+                    <a:lstStyle/>
+                    <a:p>
+                      <a:pPr algn="ctr" fontAlgn="b"/>
+                      <a:r>
+                        <a:rPr lang="es-AR" sz="1400" u="none" strike="noStrike">
+                          <a:effectLst/>
+                        </a:rPr>
+                        <a:t>1</a:t>
+                      </a:r>
+                      <a:endParaRPr lang="es-AR" sz="1400" b="0" i="0" u="none" strike="noStrike">
+                        <a:effectLst/>
+                        <a:latin typeface="Arial"/>
+                      </a:endParaRPr>
+                    </a:p>
+                  </a:txBody>
+                  <a:tcPr marL="5806" marR="5806" marT="5806" marB="0" anchor="b"/>
+                </a:tc>
+                <a:tc>
+                  <a:txBody>
+                    <a:bodyPr/>
+                    <a:lstStyle/>
+                    <a:p>
+                      <a:pPr algn="ctr" fontAlgn="b"/>
+                      <a:r>
+                        <a:rPr lang="es-AR" sz="1400" u="none" strike="noStrike">
+                          <a:effectLst/>
+                        </a:rPr>
+                        <a:t>1</a:t>
+                      </a:r>
+                      <a:endParaRPr lang="es-AR" sz="1400" b="0" i="0" u="none" strike="noStrike">
+                        <a:effectLst/>
+                        <a:latin typeface="Arial"/>
+                      </a:endParaRPr>
+                    </a:p>
+                  </a:txBody>
+                  <a:tcPr marL="5806" marR="5806" marT="5806" marB="0" anchor="b"/>
+                </a:tc>
+                <a:tc>
+                  <a:txBody>
+                    <a:bodyPr/>
+                    <a:lstStyle/>
+                    <a:p>
+                      <a:pPr algn="ctr" fontAlgn="b"/>
+                      <a:r>
+                        <a:rPr lang="es-AR" sz="1400" u="none" strike="noStrike">
+                          <a:effectLst/>
+                        </a:rPr>
+                        <a:t>1</a:t>
+                      </a:r>
+                      <a:endParaRPr lang="es-AR" sz="1400" b="0" i="0" u="none" strike="noStrike">
+                        <a:effectLst/>
+                        <a:latin typeface="Arial"/>
+                      </a:endParaRPr>
+                    </a:p>
+                  </a:txBody>
+                  <a:tcPr marL="5806" marR="5806" marT="5806" marB="0" anchor="b"/>
+                </a:tc>
+                <a:tc>
+                  <a:txBody>
+                    <a:bodyPr/>
+                    <a:lstStyle/>
+                    <a:p>
+                      <a:pPr algn="ctr" fontAlgn="b"/>
+                      <a:r>
+                        <a:rPr lang="es-AR" sz="1400" u="none" strike="noStrike">
+                          <a:effectLst/>
+                        </a:rPr>
+                        <a:t>0</a:t>
+                      </a:r>
+                      <a:endParaRPr lang="es-AR" sz="1400" b="0" i="0" u="none" strike="noStrike">
+                        <a:effectLst/>
+                        <a:latin typeface="Arial"/>
+                      </a:endParaRPr>
+                    </a:p>
+                  </a:txBody>
+                  <a:tcPr marL="5806" marR="5806" marT="5806" marB="0" anchor="b"/>
+                </a:tc>
+                <a:tc>
+                  <a:txBody>
+                    <a:bodyPr/>
+                    <a:lstStyle/>
+                    <a:p>
+                      <a:pPr algn="ctr" fontAlgn="b"/>
+                      <a:r>
+                        <a:rPr lang="es-AR" sz="1400" u="none" strike="noStrike">
+                          <a:effectLst/>
+                        </a:rPr>
+                        <a:t>0</a:t>
+                      </a:r>
+                      <a:endParaRPr lang="es-AR" sz="1400" b="0" i="0" u="none" strike="noStrike">
+                        <a:effectLst/>
+                        <a:latin typeface="Arial"/>
+                      </a:endParaRPr>
+                    </a:p>
+                  </a:txBody>
+                  <a:tcPr marL="5806" marR="5806" marT="5806" marB="0" anchor="b"/>
+                </a:tc>
+              </a:tr>
+              <a:tr h="98700">
+                <a:tc>
+                  <a:txBody>
+                    <a:bodyPr/>
+                    <a:lstStyle/>
+                    <a:p>
+                      <a:pPr algn="l" fontAlgn="b"/>
+                      <a:r>
+                        <a:rPr lang="es-AR" sz="1400" u="none" strike="noStrike">
+                          <a:effectLst/>
+                        </a:rPr>
+                        <a:t>Programador Junior</a:t>
+                      </a:r>
+                      <a:endParaRPr lang="es-AR" sz="1400" b="0" i="0" u="none" strike="noStrike">
+                        <a:effectLst/>
+                        <a:latin typeface="Arial"/>
+                      </a:endParaRPr>
+                    </a:p>
+                  </a:txBody>
+                  <a:tcPr marL="5806" marR="5806" marT="5806" marB="0" anchor="b"/>
+                </a:tc>
+                <a:tc>
+                  <a:txBody>
+                    <a:bodyPr/>
+                    <a:lstStyle/>
+                    <a:p>
+                      <a:pPr algn="r" fontAlgn="b"/>
+                      <a:r>
+                        <a:rPr lang="es-AR" sz="1400" u="none" strike="noStrike">
+                          <a:effectLst/>
+                        </a:rPr>
+                        <a:t>$ 3.000</a:t>
+                      </a:r>
+                      <a:endParaRPr lang="es-AR" sz="1400" b="0" i="0" u="none" strike="noStrike">
+                        <a:effectLst/>
+                        <a:latin typeface="Arial"/>
+                      </a:endParaRPr>
+                    </a:p>
+                  </a:txBody>
+                  <a:tcPr marL="5806" marR="5806" marT="5806" marB="0" anchor="b"/>
+                </a:tc>
+                <a:tc>
+                  <a:txBody>
+                    <a:bodyPr/>
+                    <a:lstStyle/>
+                    <a:p>
+                      <a:pPr algn="r" fontAlgn="b"/>
+                      <a:r>
+                        <a:rPr lang="es-AR" sz="1400" u="none" strike="noStrike">
+                          <a:effectLst/>
+                        </a:rPr>
+                        <a:t>$ 6.235</a:t>
+                      </a:r>
+                      <a:endParaRPr lang="es-AR" sz="1400" b="0" i="0" u="none" strike="noStrike">
+                        <a:effectLst/>
+                        <a:latin typeface="Arial"/>
+                      </a:endParaRPr>
+                    </a:p>
+                  </a:txBody>
+                  <a:tcPr marL="5806" marR="5806" marT="5806" marB="0" anchor="b"/>
+                </a:tc>
+                <a:tc>
+                  <a:txBody>
+                    <a:bodyPr/>
+                    <a:lstStyle/>
+                    <a:p>
+                      <a:pPr algn="ctr" fontAlgn="b"/>
+                      <a:r>
+                        <a:rPr lang="es-AR" sz="1400" u="none" strike="noStrike">
+                          <a:effectLst/>
+                        </a:rPr>
+                        <a:t>2</a:t>
+                      </a:r>
+                      <a:endParaRPr lang="es-AR" sz="1400" b="0" i="0" u="none" strike="noStrike">
+                        <a:effectLst/>
+                        <a:latin typeface="Arial"/>
+                      </a:endParaRPr>
+                    </a:p>
+                  </a:txBody>
+                  <a:tcPr marL="5806" marR="5806" marT="5806" marB="0" anchor="b"/>
+                </a:tc>
+                <a:tc>
+                  <a:txBody>
+                    <a:bodyPr/>
+                    <a:lstStyle/>
+                    <a:p>
+                      <a:pPr algn="ctr" fontAlgn="b"/>
+                      <a:r>
+                        <a:rPr lang="es-AR" sz="1400" u="none" strike="noStrike">
+                          <a:effectLst/>
+                        </a:rPr>
+                        <a:t>2</a:t>
+                      </a:r>
+                      <a:endParaRPr lang="es-AR" sz="1400" b="0" i="0" u="none" strike="noStrike">
+                        <a:effectLst/>
+                        <a:latin typeface="Arial"/>
+                      </a:endParaRPr>
+                    </a:p>
+                  </a:txBody>
+                  <a:tcPr marL="5806" marR="5806" marT="5806" marB="0" anchor="b"/>
+                </a:tc>
+                <a:tc>
+                  <a:txBody>
+                    <a:bodyPr/>
+                    <a:lstStyle/>
+                    <a:p>
+                      <a:pPr algn="ctr" fontAlgn="b"/>
+                      <a:r>
+                        <a:rPr lang="es-AR" sz="1400" u="none" strike="noStrike">
+                          <a:effectLst/>
+                        </a:rPr>
+                        <a:t>2</a:t>
+                      </a:r>
+                      <a:endParaRPr lang="es-AR" sz="1400" b="0" i="0" u="none" strike="noStrike">
+                        <a:effectLst/>
+                        <a:latin typeface="Arial"/>
+                      </a:endParaRPr>
+                    </a:p>
+                  </a:txBody>
+                  <a:tcPr marL="5806" marR="5806" marT="5806" marB="0" anchor="b"/>
+                </a:tc>
+                <a:tc>
+                  <a:txBody>
+                    <a:bodyPr/>
+                    <a:lstStyle/>
+                    <a:p>
+                      <a:pPr algn="ctr" fontAlgn="b"/>
+                      <a:r>
+                        <a:rPr lang="es-AR" sz="1400" u="none" strike="noStrike">
+                          <a:effectLst/>
+                        </a:rPr>
+                        <a:t>2</a:t>
+                      </a:r>
+                      <a:endParaRPr lang="es-AR" sz="1400" b="0" i="0" u="none" strike="noStrike">
+                        <a:effectLst/>
+                        <a:latin typeface="Arial"/>
+                      </a:endParaRPr>
+                    </a:p>
+                  </a:txBody>
+                  <a:tcPr marL="5806" marR="5806" marT="5806" marB="0" anchor="b"/>
+                </a:tc>
+                <a:tc>
+                  <a:txBody>
+                    <a:bodyPr/>
+                    <a:lstStyle/>
+                    <a:p>
+                      <a:pPr algn="ctr" fontAlgn="b"/>
+                      <a:r>
+                        <a:rPr lang="es-AR" sz="1400" u="none" strike="noStrike">
+                          <a:effectLst/>
+                        </a:rPr>
+                        <a:t>2</a:t>
+                      </a:r>
+                      <a:endParaRPr lang="es-AR" sz="1400" b="0" i="0" u="none" strike="noStrike">
+                        <a:effectLst/>
+                        <a:latin typeface="Arial"/>
+                      </a:endParaRPr>
+                    </a:p>
+                  </a:txBody>
+                  <a:tcPr marL="5806" marR="5806" marT="5806" marB="0" anchor="b"/>
+                </a:tc>
+                <a:tc>
+                  <a:txBody>
+                    <a:bodyPr/>
+                    <a:lstStyle/>
+                    <a:p>
+                      <a:pPr algn="ctr" fontAlgn="b"/>
+                      <a:r>
+                        <a:rPr lang="es-AR" sz="1400" u="none" strike="noStrike">
+                          <a:effectLst/>
+                        </a:rPr>
+                        <a:t>0</a:t>
+                      </a:r>
+                      <a:endParaRPr lang="es-AR" sz="1400" b="0" i="0" u="none" strike="noStrike">
+                        <a:effectLst/>
+                        <a:latin typeface="Arial"/>
+                      </a:endParaRPr>
+                    </a:p>
+                  </a:txBody>
+                  <a:tcPr marL="5806" marR="5806" marT="5806" marB="0" anchor="b"/>
+                </a:tc>
+                <a:tc>
+                  <a:txBody>
+                    <a:bodyPr/>
+                    <a:lstStyle/>
+                    <a:p>
+                      <a:pPr algn="ctr" fontAlgn="b"/>
+                      <a:r>
+                        <a:rPr lang="es-AR" sz="1400" u="none" strike="noStrike">
+                          <a:effectLst/>
+                        </a:rPr>
+                        <a:t>0</a:t>
+                      </a:r>
+                      <a:endParaRPr lang="es-AR" sz="1400" b="0" i="0" u="none" strike="noStrike">
+                        <a:effectLst/>
+                        <a:latin typeface="Arial"/>
+                      </a:endParaRPr>
+                    </a:p>
+                  </a:txBody>
+                  <a:tcPr marL="5806" marR="5806" marT="5806" marB="0" anchor="b"/>
+                </a:tc>
+              </a:tr>
+              <a:tr h="98700">
+                <a:tc>
+                  <a:txBody>
+                    <a:bodyPr/>
+                    <a:lstStyle/>
+                    <a:p>
+                      <a:pPr algn="l" fontAlgn="b"/>
+                      <a:r>
+                        <a:rPr lang="es-AR" sz="1400" u="none" strike="noStrike">
+                          <a:effectLst/>
+                        </a:rPr>
+                        <a:t>Tester</a:t>
+                      </a:r>
+                      <a:endParaRPr lang="es-AR" sz="1400" b="0" i="0" u="none" strike="noStrike">
+                        <a:effectLst/>
+                        <a:latin typeface="Arial"/>
+                      </a:endParaRPr>
+                    </a:p>
+                  </a:txBody>
+                  <a:tcPr marL="5806" marR="5806" marT="5806" marB="0" anchor="b"/>
+                </a:tc>
+                <a:tc>
+                  <a:txBody>
+                    <a:bodyPr/>
+                    <a:lstStyle/>
+                    <a:p>
+                      <a:pPr algn="r" fontAlgn="b"/>
+                      <a:r>
+                        <a:rPr lang="es-AR" sz="1400" u="none" strike="noStrike">
+                          <a:effectLst/>
+                        </a:rPr>
+                        <a:t>$ 3.000</a:t>
+                      </a:r>
+                      <a:endParaRPr lang="es-AR" sz="1400" b="0" i="0" u="none" strike="noStrike">
+                        <a:effectLst/>
+                        <a:latin typeface="Arial"/>
+                      </a:endParaRPr>
+                    </a:p>
+                  </a:txBody>
+                  <a:tcPr marL="5806" marR="5806" marT="5806" marB="0" anchor="b"/>
+                </a:tc>
+                <a:tc>
+                  <a:txBody>
+                    <a:bodyPr/>
+                    <a:lstStyle/>
+                    <a:p>
+                      <a:pPr algn="r" fontAlgn="b"/>
+                      <a:r>
+                        <a:rPr lang="es-AR" sz="1400" u="none" strike="noStrike">
+                          <a:effectLst/>
+                        </a:rPr>
+                        <a:t>$ 6.235</a:t>
+                      </a:r>
+                      <a:endParaRPr lang="es-AR" sz="1400" b="0" i="0" u="none" strike="noStrike">
+                        <a:effectLst/>
+                        <a:latin typeface="Arial"/>
+                      </a:endParaRPr>
+                    </a:p>
+                  </a:txBody>
+                  <a:tcPr marL="5806" marR="5806" marT="5806" marB="0" anchor="b"/>
+                </a:tc>
+                <a:tc>
+                  <a:txBody>
+                    <a:bodyPr/>
+                    <a:lstStyle/>
+                    <a:p>
+                      <a:pPr algn="ctr" fontAlgn="b"/>
+                      <a:r>
+                        <a:rPr lang="es-AR" sz="1400" u="none" strike="noStrike">
+                          <a:effectLst/>
+                        </a:rPr>
+                        <a:t>1</a:t>
+                      </a:r>
+                      <a:endParaRPr lang="es-AR" sz="1400" b="0" i="0" u="none" strike="noStrike">
+                        <a:effectLst/>
+                        <a:latin typeface="Arial"/>
+                      </a:endParaRPr>
+                    </a:p>
+                  </a:txBody>
+                  <a:tcPr marL="5806" marR="5806" marT="5806" marB="0" anchor="b"/>
+                </a:tc>
+                <a:tc>
+                  <a:txBody>
+                    <a:bodyPr/>
+                    <a:lstStyle/>
+                    <a:p>
+                      <a:pPr algn="ctr" fontAlgn="b"/>
+                      <a:r>
+                        <a:rPr lang="es-AR" sz="1400" u="none" strike="noStrike">
+                          <a:effectLst/>
+                        </a:rPr>
+                        <a:t>0</a:t>
+                      </a:r>
+                      <a:endParaRPr lang="es-AR" sz="1400" b="0" i="0" u="none" strike="noStrike">
+                        <a:effectLst/>
+                        <a:latin typeface="Arial"/>
+                      </a:endParaRPr>
+                    </a:p>
+                  </a:txBody>
+                  <a:tcPr marL="5806" marR="5806" marT="5806" marB="0" anchor="b"/>
+                </a:tc>
+                <a:tc>
+                  <a:txBody>
+                    <a:bodyPr/>
+                    <a:lstStyle/>
+                    <a:p>
+                      <a:pPr algn="ctr" fontAlgn="b"/>
+                      <a:r>
+                        <a:rPr lang="es-AR" sz="1400" u="none" strike="noStrike">
+                          <a:effectLst/>
+                        </a:rPr>
+                        <a:t>0</a:t>
+                      </a:r>
+                      <a:endParaRPr lang="es-AR" sz="1400" b="0" i="0" u="none" strike="noStrike">
+                        <a:effectLst/>
+                        <a:latin typeface="Arial"/>
+                      </a:endParaRPr>
+                    </a:p>
+                  </a:txBody>
+                  <a:tcPr marL="5806" marR="5806" marT="5806" marB="0" anchor="b"/>
+                </a:tc>
+                <a:tc>
+                  <a:txBody>
+                    <a:bodyPr/>
+                    <a:lstStyle/>
+                    <a:p>
+                      <a:pPr algn="ctr" fontAlgn="b"/>
+                      <a:r>
+                        <a:rPr lang="es-AR" sz="1400" u="none" strike="noStrike">
+                          <a:effectLst/>
+                        </a:rPr>
+                        <a:t>1</a:t>
+                      </a:r>
+                      <a:endParaRPr lang="es-AR" sz="1400" b="0" i="0" u="none" strike="noStrike">
+                        <a:effectLst/>
+                        <a:latin typeface="Arial"/>
+                      </a:endParaRPr>
+                    </a:p>
+                  </a:txBody>
+                  <a:tcPr marL="5806" marR="5806" marT="5806" marB="0" anchor="b"/>
+                </a:tc>
+                <a:tc>
+                  <a:txBody>
+                    <a:bodyPr/>
+                    <a:lstStyle/>
+                    <a:p>
+                      <a:pPr algn="ctr" fontAlgn="b"/>
+                      <a:r>
+                        <a:rPr lang="es-AR" sz="1400" u="none" strike="noStrike">
+                          <a:effectLst/>
+                        </a:rPr>
+                        <a:t>1</a:t>
+                      </a:r>
+                      <a:endParaRPr lang="es-AR" sz="1400" b="0" i="0" u="none" strike="noStrike">
+                        <a:effectLst/>
+                        <a:latin typeface="Arial"/>
+                      </a:endParaRPr>
+                    </a:p>
+                  </a:txBody>
+                  <a:tcPr marL="5806" marR="5806" marT="5806" marB="0" anchor="b"/>
+                </a:tc>
+                <a:tc>
+                  <a:txBody>
+                    <a:bodyPr/>
+                    <a:lstStyle/>
+                    <a:p>
+                      <a:pPr algn="ctr" fontAlgn="b"/>
+                      <a:r>
+                        <a:rPr lang="es-AR" sz="1400" u="none" strike="noStrike">
+                          <a:effectLst/>
+                        </a:rPr>
+                        <a:t>1</a:t>
+                      </a:r>
+                      <a:endParaRPr lang="es-AR" sz="1400" b="0" i="0" u="none" strike="noStrike">
+                        <a:effectLst/>
+                        <a:latin typeface="Arial"/>
+                      </a:endParaRPr>
+                    </a:p>
+                  </a:txBody>
+                  <a:tcPr marL="5806" marR="5806" marT="5806" marB="0" anchor="b"/>
+                </a:tc>
+                <a:tc>
+                  <a:txBody>
+                    <a:bodyPr/>
+                    <a:lstStyle/>
+                    <a:p>
+                      <a:pPr algn="ctr" fontAlgn="b"/>
+                      <a:r>
+                        <a:rPr lang="es-AR" sz="1400" u="none" strike="noStrike">
+                          <a:effectLst/>
+                        </a:rPr>
+                        <a:t>1</a:t>
+                      </a:r>
+                      <a:endParaRPr lang="es-AR" sz="1400" b="0" i="0" u="none" strike="noStrike">
+                        <a:effectLst/>
+                        <a:latin typeface="Arial"/>
+                      </a:endParaRPr>
+                    </a:p>
+                  </a:txBody>
+                  <a:tcPr marL="5806" marR="5806" marT="5806" marB="0" anchor="b"/>
+                </a:tc>
+              </a:tr>
+              <a:tr h="191595">
+                <a:tc>
+                  <a:txBody>
+                    <a:bodyPr/>
+                    <a:lstStyle/>
+                    <a:p>
+                      <a:pPr algn="l" fontAlgn="b"/>
+                      <a:r>
+                        <a:rPr lang="es-AR" sz="1400" u="none" strike="noStrike">
+                          <a:effectLst/>
+                        </a:rPr>
+                        <a:t>Total de Recursos Humanos</a:t>
+                      </a:r>
+                      <a:endParaRPr lang="es-AR" sz="1400" b="1" i="0" u="none" strike="noStrike">
+                        <a:solidFill>
+                          <a:srgbClr val="FFFFFF"/>
+                        </a:solidFill>
+                        <a:effectLst/>
+                        <a:latin typeface="Arial"/>
+                      </a:endParaRPr>
+                    </a:p>
+                  </a:txBody>
+                  <a:tcPr marL="5806" marR="5806" marT="5806" marB="0" anchor="b"/>
+                </a:tc>
+                <a:tc>
+                  <a:txBody>
+                    <a:bodyPr/>
+                    <a:lstStyle/>
+                    <a:p>
+                      <a:pPr algn="r" fontAlgn="b"/>
+                      <a:r>
+                        <a:rPr lang="es-AR" sz="1400" u="none" strike="noStrike">
+                          <a:effectLst/>
+                        </a:rPr>
+                        <a:t> </a:t>
+                      </a:r>
+                      <a:endParaRPr lang="es-AR" sz="1400" b="1" i="0" u="none" strike="noStrike">
+                        <a:solidFill>
+                          <a:srgbClr val="FFFFFF"/>
+                        </a:solidFill>
+                        <a:effectLst/>
+                        <a:latin typeface="Arial"/>
+                      </a:endParaRPr>
+                    </a:p>
+                  </a:txBody>
+                  <a:tcPr marL="5806" marR="5806" marT="5806" marB="0" anchor="b"/>
+                </a:tc>
+                <a:tc>
+                  <a:txBody>
+                    <a:bodyPr/>
+                    <a:lstStyle/>
+                    <a:p>
+                      <a:pPr algn="r" fontAlgn="b"/>
+                      <a:r>
+                        <a:rPr lang="es-AR" sz="1400" u="none" strike="noStrike">
+                          <a:effectLst/>
+                        </a:rPr>
+                        <a:t> </a:t>
+                      </a:r>
+                      <a:endParaRPr lang="es-AR" sz="1400" b="1" i="0" u="none" strike="noStrike">
+                        <a:solidFill>
+                          <a:srgbClr val="FFFFFF"/>
+                        </a:solidFill>
+                        <a:effectLst/>
+                        <a:latin typeface="Arial"/>
+                      </a:endParaRPr>
+                    </a:p>
+                  </a:txBody>
+                  <a:tcPr marL="5806" marR="5806" marT="5806" marB="0" anchor="b"/>
+                </a:tc>
+                <a:tc>
+                  <a:txBody>
+                    <a:bodyPr/>
+                    <a:lstStyle/>
+                    <a:p>
+                      <a:pPr algn="ctr" fontAlgn="b"/>
+                      <a:r>
+                        <a:rPr lang="es-AR" sz="1400" u="none" strike="noStrike">
+                          <a:effectLst/>
+                        </a:rPr>
+                        <a:t>8</a:t>
+                      </a:r>
+                      <a:endParaRPr lang="es-AR" sz="1400" b="1" i="0" u="none" strike="noStrike">
+                        <a:solidFill>
+                          <a:srgbClr val="FFFFFF"/>
+                        </a:solidFill>
+                        <a:effectLst/>
+                        <a:latin typeface="Arial"/>
+                      </a:endParaRPr>
+                    </a:p>
+                  </a:txBody>
+                  <a:tcPr marL="5806" marR="5806" marT="5806" marB="0" anchor="b"/>
+                </a:tc>
+                <a:tc>
+                  <a:txBody>
+                    <a:bodyPr/>
+                    <a:lstStyle/>
+                    <a:p>
+                      <a:pPr algn="ctr" fontAlgn="b"/>
+                      <a:r>
+                        <a:rPr lang="es-AR" sz="1400" u="none" strike="noStrike">
+                          <a:effectLst/>
+                        </a:rPr>
+                        <a:t>4</a:t>
+                      </a:r>
+                      <a:endParaRPr lang="es-AR" sz="1400" b="1" i="0" u="none" strike="noStrike">
+                        <a:solidFill>
+                          <a:srgbClr val="FFFFFF"/>
+                        </a:solidFill>
+                        <a:effectLst/>
+                        <a:latin typeface="Arial"/>
+                      </a:endParaRPr>
+                    </a:p>
+                  </a:txBody>
+                  <a:tcPr marL="5806" marR="5806" marT="5806" marB="0" anchor="b"/>
+                </a:tc>
+                <a:tc>
+                  <a:txBody>
+                    <a:bodyPr/>
+                    <a:lstStyle/>
+                    <a:p>
+                      <a:pPr algn="ctr" fontAlgn="b"/>
+                      <a:r>
+                        <a:rPr lang="es-AR" sz="1400" u="none" strike="noStrike">
+                          <a:effectLst/>
+                        </a:rPr>
+                        <a:t>7</a:t>
+                      </a:r>
+                      <a:endParaRPr lang="es-AR" sz="1400" b="1" i="0" u="none" strike="noStrike">
+                        <a:solidFill>
+                          <a:srgbClr val="FFFFFF"/>
+                        </a:solidFill>
+                        <a:effectLst/>
+                        <a:latin typeface="Arial"/>
+                      </a:endParaRPr>
+                    </a:p>
+                  </a:txBody>
+                  <a:tcPr marL="5806" marR="5806" marT="5806" marB="0" anchor="b"/>
+                </a:tc>
+                <a:tc>
+                  <a:txBody>
+                    <a:bodyPr/>
+                    <a:lstStyle/>
+                    <a:p>
+                      <a:pPr algn="ctr" fontAlgn="b"/>
+                      <a:r>
+                        <a:rPr lang="es-AR" sz="1400" u="none" strike="noStrike">
+                          <a:effectLst/>
+                        </a:rPr>
+                        <a:t>8</a:t>
+                      </a:r>
+                      <a:endParaRPr lang="es-AR" sz="1400" b="1" i="0" u="none" strike="noStrike">
+                        <a:solidFill>
+                          <a:srgbClr val="FFFFFF"/>
+                        </a:solidFill>
+                        <a:effectLst/>
+                        <a:latin typeface="Arial"/>
+                      </a:endParaRPr>
+                    </a:p>
+                  </a:txBody>
+                  <a:tcPr marL="5806" marR="5806" marT="5806" marB="0" anchor="b"/>
+                </a:tc>
+                <a:tc>
+                  <a:txBody>
+                    <a:bodyPr/>
+                    <a:lstStyle/>
+                    <a:p>
+                      <a:pPr algn="ctr" fontAlgn="b"/>
+                      <a:r>
+                        <a:rPr lang="es-AR" sz="1400" u="none" strike="noStrike">
+                          <a:effectLst/>
+                        </a:rPr>
+                        <a:t>8</a:t>
+                      </a:r>
+                      <a:endParaRPr lang="es-AR" sz="1400" b="1" i="0" u="none" strike="noStrike">
+                        <a:solidFill>
+                          <a:srgbClr val="FFFFFF"/>
+                        </a:solidFill>
+                        <a:effectLst/>
+                        <a:latin typeface="Arial"/>
+                      </a:endParaRPr>
+                    </a:p>
+                  </a:txBody>
+                  <a:tcPr marL="5806" marR="5806" marT="5806" marB="0" anchor="b"/>
+                </a:tc>
+                <a:tc>
+                  <a:txBody>
+                    <a:bodyPr/>
+                    <a:lstStyle/>
+                    <a:p>
+                      <a:pPr algn="ctr" fontAlgn="b"/>
+                      <a:r>
+                        <a:rPr lang="es-AR" sz="1400" u="none" strike="noStrike">
+                          <a:effectLst/>
+                        </a:rPr>
+                        <a:t>5</a:t>
+                      </a:r>
+                      <a:endParaRPr lang="es-AR" sz="1400" b="1" i="0" u="none" strike="noStrike">
+                        <a:solidFill>
+                          <a:srgbClr val="FFFFFF"/>
+                        </a:solidFill>
+                        <a:effectLst/>
+                        <a:latin typeface="Arial"/>
+                      </a:endParaRPr>
+                    </a:p>
+                  </a:txBody>
+                  <a:tcPr marL="5806" marR="5806" marT="5806" marB="0" anchor="b"/>
+                </a:tc>
+                <a:tc>
+                  <a:txBody>
+                    <a:bodyPr/>
+                    <a:lstStyle/>
+                    <a:p>
+                      <a:pPr algn="ctr" fontAlgn="b"/>
+                      <a:r>
+                        <a:rPr lang="es-AR" sz="1400" u="none" strike="noStrike" dirty="0">
+                          <a:effectLst/>
+                        </a:rPr>
+                        <a:t>5</a:t>
+                      </a:r>
+                      <a:endParaRPr lang="es-AR" sz="1400" b="1" i="0" u="none" strike="noStrike" dirty="0">
+                        <a:solidFill>
+                          <a:srgbClr val="FFFFFF"/>
+                        </a:solidFill>
+                        <a:effectLst/>
+                        <a:latin typeface="Arial"/>
+                      </a:endParaRPr>
+                    </a:p>
+                  </a:txBody>
+                  <a:tcPr marL="5806" marR="5806" marT="5806" marB="0" anchor="b"/>
+                </a:tc>
+              </a:tr>
+            </a:tbl>
+          </a:graphicData>
+        </a:graphic>
+      </p:graphicFrame>
       <p:sp>
         <p:nvSpPr>
-          <p:cNvPr id="3" name="Content Placeholder 2"/>
+          <p:cNvPr id="4" name="Text Placeholder 3"/>
           <p:cNvSpPr>
             <a:spLocks noGrp="1"/>
           </p:cNvSpPr>
           <p:nvPr>
-            <p:ph idx="1"/>
+            <p:ph type="body" sz="quarter" idx="13"/>
           </p:nvPr>
         </p:nvSpPr>
         <p:spPr/>
@@ -13026,14 +14912,52 @@
           <a:bodyPr/>
           <a:lstStyle/>
           <a:p>
-            <a:endParaRPr lang="es-AR"/>
+            <a:r>
+              <a:rPr lang="es-AR" dirty="0" err="1" smtClean="0"/>
+              <a:t>Utilizacion</a:t>
+            </a:r>
+            <a:r>
+              <a:rPr lang="es-AR" dirty="0" smtClean="0"/>
+              <a:t> de Recursos en el Proyecto</a:t>
+            </a:r>
+            <a:endParaRPr lang="es-AR" dirty="0"/>
+          </a:p>
+        </p:txBody>
+      </p:sp>
+      <p:sp>
+        <p:nvSpPr>
+          <p:cNvPr id="6" name="TextBox 5"/>
+          <p:cNvSpPr txBox="1"/>
+          <p:nvPr/>
+        </p:nvSpPr>
+        <p:spPr>
+          <a:xfrm>
+            <a:off x="1907704" y="4221088"/>
+            <a:ext cx="5400600" cy="369332"/>
+          </a:xfrm>
+          <a:prstGeom prst="rect">
+            <a:avLst/>
+          </a:prstGeom>
+          <a:noFill/>
+        </p:spPr>
+        <p:txBody>
+          <a:bodyPr wrap="square" rtlCol="0">
+            <a:spAutoFit/>
+          </a:bodyPr>
+          <a:lstStyle/>
+          <a:p>
+            <a:r>
+              <a:rPr lang="es-AR" dirty="0" smtClean="0"/>
+              <a:t>Calculando una merma de productividad del 15 %</a:t>
+            </a:r>
+            <a:endParaRPr lang="es-AR" dirty="0"/>
           </a:p>
         </p:txBody>
       </p:sp>
     </p:spTree>
     <p:extLst>
       <p:ext uri="{BB962C8B-B14F-4D97-AF65-F5344CB8AC3E}">
-        <p14:creationId xmlns:p14="http://schemas.microsoft.com/office/powerpoint/2010/main" val="3579918999"/>
+        <p14:creationId xmlns:p14="http://schemas.microsoft.com/office/powerpoint/2010/main" val="4255643014"/>
       </p:ext>
     </p:extLst>
   </p:cSld>
@@ -13076,8 +15000,12 @@
           <a:lstStyle/>
           <a:p>
             <a:r>
+              <a:rPr lang="es-AR" dirty="0" err="1" smtClean="0"/>
+              <a:t>Duracion</a:t>
+            </a:r>
+            <a:r>
               <a:rPr lang="es-AR" dirty="0" smtClean="0"/>
-              <a:t>Costos Mensuales</a:t>
+              <a:t> Total del proyecto</a:t>
             </a:r>
             <a:endParaRPr lang="es-AR" dirty="0"/>
           </a:p>
@@ -13098,14 +15026,26 @@
           <a:bodyPr/>
           <a:lstStyle/>
           <a:p>
-            <a:endParaRPr lang="es-AR"/>
+            <a:r>
+              <a:rPr lang="es-AR" dirty="0" smtClean="0"/>
+              <a:t>6 Meses y Medio (215 </a:t>
+            </a:r>
+            <a:r>
+              <a:rPr lang="es-AR" dirty="0" err="1" smtClean="0"/>
+              <a:t>dias</a:t>
+            </a:r>
+            <a:r>
+              <a:rPr lang="es-AR" dirty="0" smtClean="0"/>
+              <a:t> laborales)</a:t>
+            </a:r>
+            <a:endParaRPr lang="es-AR" dirty="0"/>
           </a:p>
         </p:txBody>
       </p:sp>
     </p:spTree>
     <p:extLst>
       <p:ext uri="{BB962C8B-B14F-4D97-AF65-F5344CB8AC3E}">
-        <p14:creationId xmlns:p14="http://schemas.microsoft.com/office/powerpoint/2010/main" val="880074258"/>
+        <p14:creationId xmlns:p14="http://schemas.microsoft.com/office/powerpoint/2010/main" val="226919251"/>
       </p:ext>
     </p:extLst>
   </p:cSld>
@@ -13149,7 +15089,7 @@
           <a:p>
             <a:r>
               <a:rPr lang="es-AR" dirty="0" smtClean="0"/>
-              <a:t>Entregas</a:t>
+              <a:t>Costos Iniciales</a:t>
             </a:r>
             <a:endParaRPr lang="es-AR" dirty="0"/>
           </a:p>
@@ -13174,29 +15114,10 @@
           </a:p>
         </p:txBody>
       </p:sp>
-      <p:sp>
-        <p:nvSpPr>
-          <p:cNvPr id="4" name="Text Placeholder 3"/>
-          <p:cNvSpPr>
-            <a:spLocks noGrp="1"/>
-          </p:cNvSpPr>
-          <p:nvPr>
-            <p:ph type="body" sz="quarter" idx="13"/>
-          </p:nvPr>
-        </p:nvSpPr>
-        <p:spPr/>
-        <p:txBody>
-          <a:bodyPr/>
-          <a:lstStyle/>
-          <a:p>
-            <a:endParaRPr lang="es-AR"/>
-          </a:p>
-        </p:txBody>
-      </p:sp>
     </p:spTree>
     <p:extLst>
       <p:ext uri="{BB962C8B-B14F-4D97-AF65-F5344CB8AC3E}">
-        <p14:creationId xmlns:p14="http://schemas.microsoft.com/office/powerpoint/2010/main" val="2424612366"/>
+        <p14:creationId xmlns:p14="http://schemas.microsoft.com/office/powerpoint/2010/main" val="3579918999"/>
       </p:ext>
     </p:extLst>
   </p:cSld>
@@ -13240,7 +15161,7 @@
           <a:p>
             <a:r>
               <a:rPr lang="es-AR" dirty="0" smtClean="0"/>
-              <a:t>Pagos y Ganancias</a:t>
+              <a:t>Costos Mensuales</a:t>
             </a:r>
             <a:endParaRPr lang="es-AR" dirty="0"/>
           </a:p>
@@ -13265,29 +15186,10 @@
           </a:p>
         </p:txBody>
       </p:sp>
-      <p:sp>
-        <p:nvSpPr>
-          <p:cNvPr id="4" name="Text Placeholder 3"/>
-          <p:cNvSpPr>
-            <a:spLocks noGrp="1"/>
-          </p:cNvSpPr>
-          <p:nvPr>
-            <p:ph type="body" sz="quarter" idx="13"/>
-          </p:nvPr>
-        </p:nvSpPr>
-        <p:spPr/>
-        <p:txBody>
-          <a:bodyPr/>
-          <a:lstStyle/>
-          <a:p>
-            <a:endParaRPr lang="es-AR"/>
-          </a:p>
-        </p:txBody>
-      </p:sp>
     </p:spTree>
     <p:extLst>
       <p:ext uri="{BB962C8B-B14F-4D97-AF65-F5344CB8AC3E}">
-        <p14:creationId xmlns:p14="http://schemas.microsoft.com/office/powerpoint/2010/main" val="3383677935"/>
+        <p14:creationId xmlns:p14="http://schemas.microsoft.com/office/powerpoint/2010/main" val="880074258"/>
       </p:ext>
     </p:extLst>
   </p:cSld>
@@ -13434,6 +15336,188 @@
     <p:extLst>
       <p:ext uri="{BB962C8B-B14F-4D97-AF65-F5344CB8AC3E}">
         <p14:creationId xmlns:p14="http://schemas.microsoft.com/office/powerpoint/2010/main" val="775365642"/>
+      </p:ext>
+    </p:extLst>
+  </p:cSld>
+  <p:clrMapOvr>
+    <a:masterClrMapping/>
+  </p:clrMapOvr>
+</p:sld>
+</file>
+
+<file path=ppt/slides/slide30.xml><?xml version="1.0" encoding="utf-8"?>
+<p:sld xmlns:a="http://schemas.openxmlformats.org/drawingml/2006/main" xmlns:r="http://schemas.openxmlformats.org/officeDocument/2006/relationships" xmlns:p="http://schemas.openxmlformats.org/presentationml/2006/main">
+  <p:cSld>
+    <p:spTree>
+      <p:nvGrpSpPr>
+        <p:cNvPr id="1" name=""/>
+        <p:cNvGrpSpPr/>
+        <p:nvPr/>
+      </p:nvGrpSpPr>
+      <p:grpSpPr>
+        <a:xfrm>
+          <a:off x="0" y="0"/>
+          <a:ext cx="0" cy="0"/>
+          <a:chOff x="0" y="0"/>
+          <a:chExt cx="0" cy="0"/>
+        </a:xfrm>
+      </p:grpSpPr>
+      <p:sp>
+        <p:nvSpPr>
+          <p:cNvPr id="2" name="Title 1"/>
+          <p:cNvSpPr>
+            <a:spLocks noGrp="1"/>
+          </p:cNvSpPr>
+          <p:nvPr>
+            <p:ph type="title"/>
+          </p:nvPr>
+        </p:nvSpPr>
+        <p:spPr/>
+        <p:txBody>
+          <a:bodyPr/>
+          <a:lstStyle/>
+          <a:p>
+            <a:r>
+              <a:rPr lang="es-AR" dirty="0" smtClean="0"/>
+              <a:t>Entregas</a:t>
+            </a:r>
+            <a:endParaRPr lang="es-AR" dirty="0"/>
+          </a:p>
+        </p:txBody>
+      </p:sp>
+      <p:sp>
+        <p:nvSpPr>
+          <p:cNvPr id="3" name="Content Placeholder 2"/>
+          <p:cNvSpPr>
+            <a:spLocks noGrp="1"/>
+          </p:cNvSpPr>
+          <p:nvPr>
+            <p:ph idx="1"/>
+          </p:nvPr>
+        </p:nvSpPr>
+        <p:spPr/>
+        <p:txBody>
+          <a:bodyPr/>
+          <a:lstStyle/>
+          <a:p>
+            <a:endParaRPr lang="es-AR"/>
+          </a:p>
+        </p:txBody>
+      </p:sp>
+      <p:sp>
+        <p:nvSpPr>
+          <p:cNvPr id="4" name="Text Placeholder 3"/>
+          <p:cNvSpPr>
+            <a:spLocks noGrp="1"/>
+          </p:cNvSpPr>
+          <p:nvPr>
+            <p:ph type="body" sz="quarter" idx="13"/>
+          </p:nvPr>
+        </p:nvSpPr>
+        <p:spPr/>
+        <p:txBody>
+          <a:bodyPr/>
+          <a:lstStyle/>
+          <a:p>
+            <a:endParaRPr lang="es-AR"/>
+          </a:p>
+        </p:txBody>
+      </p:sp>
+    </p:spTree>
+    <p:extLst>
+      <p:ext uri="{BB962C8B-B14F-4D97-AF65-F5344CB8AC3E}">
+        <p14:creationId xmlns:p14="http://schemas.microsoft.com/office/powerpoint/2010/main" val="2424612366"/>
+      </p:ext>
+    </p:extLst>
+  </p:cSld>
+  <p:clrMapOvr>
+    <a:masterClrMapping/>
+  </p:clrMapOvr>
+</p:sld>
+</file>
+
+<file path=ppt/slides/slide31.xml><?xml version="1.0" encoding="utf-8"?>
+<p:sld xmlns:a="http://schemas.openxmlformats.org/drawingml/2006/main" xmlns:r="http://schemas.openxmlformats.org/officeDocument/2006/relationships" xmlns:p="http://schemas.openxmlformats.org/presentationml/2006/main">
+  <p:cSld>
+    <p:spTree>
+      <p:nvGrpSpPr>
+        <p:cNvPr id="1" name=""/>
+        <p:cNvGrpSpPr/>
+        <p:nvPr/>
+      </p:nvGrpSpPr>
+      <p:grpSpPr>
+        <a:xfrm>
+          <a:off x="0" y="0"/>
+          <a:ext cx="0" cy="0"/>
+          <a:chOff x="0" y="0"/>
+          <a:chExt cx="0" cy="0"/>
+        </a:xfrm>
+      </p:grpSpPr>
+      <p:sp>
+        <p:nvSpPr>
+          <p:cNvPr id="2" name="Title 1"/>
+          <p:cNvSpPr>
+            <a:spLocks noGrp="1"/>
+          </p:cNvSpPr>
+          <p:nvPr>
+            <p:ph type="title"/>
+          </p:nvPr>
+        </p:nvSpPr>
+        <p:spPr/>
+        <p:txBody>
+          <a:bodyPr/>
+          <a:lstStyle/>
+          <a:p>
+            <a:r>
+              <a:rPr lang="es-AR" dirty="0" smtClean="0"/>
+              <a:t>Pagos y Ganancias</a:t>
+            </a:r>
+            <a:endParaRPr lang="es-AR" dirty="0"/>
+          </a:p>
+        </p:txBody>
+      </p:sp>
+      <p:sp>
+        <p:nvSpPr>
+          <p:cNvPr id="3" name="Content Placeholder 2"/>
+          <p:cNvSpPr>
+            <a:spLocks noGrp="1"/>
+          </p:cNvSpPr>
+          <p:nvPr>
+            <p:ph idx="1"/>
+          </p:nvPr>
+        </p:nvSpPr>
+        <p:spPr/>
+        <p:txBody>
+          <a:bodyPr/>
+          <a:lstStyle/>
+          <a:p>
+            <a:endParaRPr lang="es-AR"/>
+          </a:p>
+        </p:txBody>
+      </p:sp>
+      <p:sp>
+        <p:nvSpPr>
+          <p:cNvPr id="4" name="Text Placeholder 3"/>
+          <p:cNvSpPr>
+            <a:spLocks noGrp="1"/>
+          </p:cNvSpPr>
+          <p:nvPr>
+            <p:ph type="body" sz="quarter" idx="13"/>
+          </p:nvPr>
+        </p:nvSpPr>
+        <p:spPr/>
+        <p:txBody>
+          <a:bodyPr/>
+          <a:lstStyle/>
+          <a:p>
+            <a:endParaRPr lang="es-AR"/>
+          </a:p>
+        </p:txBody>
+      </p:sp>
+    </p:spTree>
+    <p:extLst>
+      <p:ext uri="{BB962C8B-B14F-4D97-AF65-F5344CB8AC3E}">
+        <p14:creationId xmlns:p14="http://schemas.microsoft.com/office/powerpoint/2010/main" val="3383677935"/>
       </p:ext>
     </p:extLst>
   </p:cSld>

</xml_diff>